<commit_message>
removing html knitting of working examples, adding flow data chart extense and short inside vignettes folder
</commit_message>
<xml_diff>
--- a/modelling/vignettes/folders_file_ppt_diagrama.pptx
+++ b/modelling/vignettes/folders_file_ppt_diagrama.pptx
@@ -8,6 +8,8 @@
     <p:sldId id="256" r:id="rId2"/>
     <p:sldId id="257" r:id="rId3"/>
     <p:sldId id="259" r:id="rId4"/>
+    <p:sldId id="260" r:id="rId5"/>
+    <p:sldId id="261" r:id="rId6"/>
   </p:sldIdLst>
   <p:sldSz cx="12192000" cy="6858000"/>
   <p:notesSz cx="6858000" cy="9144000"/>
@@ -263,7 +265,7 @@
           <a:p>
             <a:fld id="{3DCC76CB-27C0-4377-89BA-E1E057E8A321}" type="datetimeFigureOut">
               <a:rPr lang="es-CO" smtClean="0"/>
-              <a:t>9/08/2023</a:t>
+              <a:t>27/09/2023</a:t>
             </a:fld>
             <a:endParaRPr lang="es-CO"/>
           </a:p>
@@ -463,7 +465,7 @@
           <a:p>
             <a:fld id="{3DCC76CB-27C0-4377-89BA-E1E057E8A321}" type="datetimeFigureOut">
               <a:rPr lang="es-CO" smtClean="0"/>
-              <a:t>9/08/2023</a:t>
+              <a:t>27/09/2023</a:t>
             </a:fld>
             <a:endParaRPr lang="es-CO"/>
           </a:p>
@@ -673,7 +675,7 @@
           <a:p>
             <a:fld id="{3DCC76CB-27C0-4377-89BA-E1E057E8A321}" type="datetimeFigureOut">
               <a:rPr lang="es-CO" smtClean="0"/>
-              <a:t>9/08/2023</a:t>
+              <a:t>27/09/2023</a:t>
             </a:fld>
             <a:endParaRPr lang="es-CO"/>
           </a:p>
@@ -873,7 +875,7 @@
           <a:p>
             <a:fld id="{3DCC76CB-27C0-4377-89BA-E1E057E8A321}" type="datetimeFigureOut">
               <a:rPr lang="es-CO" smtClean="0"/>
-              <a:t>9/08/2023</a:t>
+              <a:t>27/09/2023</a:t>
             </a:fld>
             <a:endParaRPr lang="es-CO"/>
           </a:p>
@@ -1149,7 +1151,7 @@
           <a:p>
             <a:fld id="{3DCC76CB-27C0-4377-89BA-E1E057E8A321}" type="datetimeFigureOut">
               <a:rPr lang="es-CO" smtClean="0"/>
-              <a:t>9/08/2023</a:t>
+              <a:t>27/09/2023</a:t>
             </a:fld>
             <a:endParaRPr lang="es-CO"/>
           </a:p>
@@ -1417,7 +1419,7 @@
           <a:p>
             <a:fld id="{3DCC76CB-27C0-4377-89BA-E1E057E8A321}" type="datetimeFigureOut">
               <a:rPr lang="es-CO" smtClean="0"/>
-              <a:t>9/08/2023</a:t>
+              <a:t>27/09/2023</a:t>
             </a:fld>
             <a:endParaRPr lang="es-CO"/>
           </a:p>
@@ -1832,7 +1834,7 @@
           <a:p>
             <a:fld id="{3DCC76CB-27C0-4377-89BA-E1E057E8A321}" type="datetimeFigureOut">
               <a:rPr lang="es-CO" smtClean="0"/>
-              <a:t>9/08/2023</a:t>
+              <a:t>27/09/2023</a:t>
             </a:fld>
             <a:endParaRPr lang="es-CO"/>
           </a:p>
@@ -1974,7 +1976,7 @@
           <a:p>
             <a:fld id="{3DCC76CB-27C0-4377-89BA-E1E057E8A321}" type="datetimeFigureOut">
               <a:rPr lang="es-CO" smtClean="0"/>
-              <a:t>9/08/2023</a:t>
+              <a:t>27/09/2023</a:t>
             </a:fld>
             <a:endParaRPr lang="es-CO"/>
           </a:p>
@@ -2087,7 +2089,7 @@
           <a:p>
             <a:fld id="{3DCC76CB-27C0-4377-89BA-E1E057E8A321}" type="datetimeFigureOut">
               <a:rPr lang="es-CO" smtClean="0"/>
-              <a:t>9/08/2023</a:t>
+              <a:t>27/09/2023</a:t>
             </a:fld>
             <a:endParaRPr lang="es-CO"/>
           </a:p>
@@ -2400,7 +2402,7 @@
           <a:p>
             <a:fld id="{3DCC76CB-27C0-4377-89BA-E1E057E8A321}" type="datetimeFigureOut">
               <a:rPr lang="es-CO" smtClean="0"/>
-              <a:t>9/08/2023</a:t>
+              <a:t>27/09/2023</a:t>
             </a:fld>
             <a:endParaRPr lang="es-CO"/>
           </a:p>
@@ -2689,7 +2691,7 @@
           <a:p>
             <a:fld id="{3DCC76CB-27C0-4377-89BA-E1E057E8A321}" type="datetimeFigureOut">
               <a:rPr lang="es-CO" smtClean="0"/>
-              <a:t>9/08/2023</a:t>
+              <a:t>27/09/2023</a:t>
             </a:fld>
             <a:endParaRPr lang="es-CO"/>
           </a:p>
@@ -2932,7 +2934,7 @@
           <a:p>
             <a:fld id="{3DCC76CB-27C0-4377-89BA-E1E057E8A321}" type="datetimeFigureOut">
               <a:rPr lang="es-CO" smtClean="0"/>
-              <a:t>9/08/2023</a:t>
+              <a:t>27/09/2023</a:t>
             </a:fld>
             <a:endParaRPr lang="es-CO"/>
           </a:p>
@@ -8621,6 +8623,2100 @@
 </p:sld>
 </file>
 
+<file path=ppt/slides/slide4.xml><?xml version="1.0" encoding="utf-8"?>
+<p:sld xmlns:a="http://schemas.openxmlformats.org/drawingml/2006/main" xmlns:r="http://schemas.openxmlformats.org/officeDocument/2006/relationships" xmlns:p="http://schemas.openxmlformats.org/presentationml/2006/main">
+  <p:cSld>
+    <p:spTree>
+      <p:nvGrpSpPr>
+        <p:cNvPr id="1" name=""/>
+        <p:cNvGrpSpPr/>
+        <p:nvPr/>
+      </p:nvGrpSpPr>
+      <p:grpSpPr>
+        <a:xfrm>
+          <a:off x="0" y="0"/>
+          <a:ext cx="0" cy="0"/>
+          <a:chOff x="0" y="0"/>
+          <a:chExt cx="0" cy="0"/>
+        </a:xfrm>
+      </p:grpSpPr>
+      <p:sp>
+        <p:nvSpPr>
+          <p:cNvPr id="2" name="Título 1">
+            <a:extLst>
+              <a:ext uri="{FF2B5EF4-FFF2-40B4-BE49-F238E27FC236}">
+                <a16:creationId xmlns:a16="http://schemas.microsoft.com/office/drawing/2014/main" id="{35A9384A-1EE3-C5D5-89C9-942B510DC356}"/>
+              </a:ext>
+            </a:extLst>
+          </p:cNvPr>
+          <p:cNvSpPr>
+            <a:spLocks noGrp="1"/>
+          </p:cNvSpPr>
+          <p:nvPr>
+            <p:ph type="title"/>
+          </p:nvPr>
+        </p:nvSpPr>
+        <p:spPr/>
+        <p:txBody>
+          <a:bodyPr/>
+          <a:lstStyle/>
+          <a:p>
+            <a:endParaRPr lang="es-CO"/>
+          </a:p>
+        </p:txBody>
+      </p:sp>
+      <p:pic>
+        <p:nvPicPr>
+          <p:cNvPr id="3" name="Picture 2">
+            <a:extLst>
+              <a:ext uri="{FF2B5EF4-FFF2-40B4-BE49-F238E27FC236}">
+                <a16:creationId xmlns:a16="http://schemas.microsoft.com/office/drawing/2014/main" id="{3699E293-A562-B6C0-B2CC-3A921EF3401B}"/>
+              </a:ext>
+            </a:extLst>
+          </p:cNvPr>
+          <p:cNvPicPr>
+            <a:picLocks noChangeAspect="1" noChangeArrowheads="1"/>
+          </p:cNvPicPr>
+          <p:nvPr/>
+        </p:nvPicPr>
+        <p:blipFill>
+          <a:blip r:embed="rId2">
+            <a:extLst>
+              <a:ext uri="{28A0092B-C50C-407E-A947-70E740481C1C}">
+                <a14:useLocalDpi xmlns:a14="http://schemas.microsoft.com/office/drawing/2010/main" val="0"/>
+              </a:ext>
+            </a:extLst>
+          </a:blip>
+          <a:srcRect/>
+          <a:stretch>
+            <a:fillRect/>
+          </a:stretch>
+        </p:blipFill>
+        <p:spPr bwMode="auto">
+          <a:xfrm>
+            <a:off x="890588" y="0"/>
+            <a:ext cx="10410825" cy="6858000"/>
+          </a:xfrm>
+          <a:prstGeom prst="rect">
+            <a:avLst/>
+          </a:prstGeom>
+          <a:noFill/>
+          <a:extLst>
+            <a:ext uri="{909E8E84-426E-40DD-AFC4-6F175D3DCCD1}">
+              <a14:hiddenFill xmlns:a14="http://schemas.microsoft.com/office/drawing/2010/main">
+                <a:solidFill>
+                  <a:srgbClr val="FFFFFF"/>
+                </a:solidFill>
+              </a14:hiddenFill>
+            </a:ext>
+          </a:extLst>
+        </p:spPr>
+      </p:pic>
+    </p:spTree>
+    <p:extLst>
+      <p:ext uri="{BB962C8B-B14F-4D97-AF65-F5344CB8AC3E}">
+        <p14:creationId xmlns:p14="http://schemas.microsoft.com/office/powerpoint/2010/main" val="473655738"/>
+      </p:ext>
+    </p:extLst>
+  </p:cSld>
+  <p:clrMapOvr>
+    <a:masterClrMapping/>
+  </p:clrMapOvr>
+</p:sld>
+</file>
+
+<file path=ppt/slides/slide5.xml><?xml version="1.0" encoding="utf-8"?>
+<p:sld xmlns:a="http://schemas.openxmlformats.org/drawingml/2006/main" xmlns:r="http://schemas.openxmlformats.org/officeDocument/2006/relationships" xmlns:p="http://schemas.openxmlformats.org/presentationml/2006/main">
+  <p:cSld>
+    <p:spTree>
+      <p:nvGrpSpPr>
+        <p:cNvPr id="1" name=""/>
+        <p:cNvGrpSpPr/>
+        <p:nvPr/>
+      </p:nvGrpSpPr>
+      <p:grpSpPr>
+        <a:xfrm>
+          <a:off x="0" y="0"/>
+          <a:ext cx="0" cy="0"/>
+          <a:chOff x="0" y="0"/>
+          <a:chExt cx="0" cy="0"/>
+        </a:xfrm>
+      </p:grpSpPr>
+      <p:sp>
+        <p:nvSpPr>
+          <p:cNvPr id="2" name="Título 1">
+            <a:extLst>
+              <a:ext uri="{FF2B5EF4-FFF2-40B4-BE49-F238E27FC236}">
+                <a16:creationId xmlns:a16="http://schemas.microsoft.com/office/drawing/2014/main" id="{ED39ED3F-1E4C-B341-D09F-B92CFEF0B29E}"/>
+              </a:ext>
+            </a:extLst>
+          </p:cNvPr>
+          <p:cNvSpPr>
+            <a:spLocks noGrp="1"/>
+          </p:cNvSpPr>
+          <p:nvPr>
+            <p:ph type="title"/>
+          </p:nvPr>
+        </p:nvSpPr>
+        <p:spPr/>
+        <p:txBody>
+          <a:bodyPr/>
+          <a:lstStyle/>
+          <a:p>
+            <a:endParaRPr lang="es-CO"/>
+          </a:p>
+        </p:txBody>
+      </p:sp>
+      <p:pic>
+        <p:nvPicPr>
+          <p:cNvPr id="3" name="Picture 2">
+            <a:extLst>
+              <a:ext uri="{FF2B5EF4-FFF2-40B4-BE49-F238E27FC236}">
+                <a16:creationId xmlns:a16="http://schemas.microsoft.com/office/drawing/2014/main" id="{D051B74B-54CE-C4FF-EE24-8B8B72295811}"/>
+              </a:ext>
+            </a:extLst>
+          </p:cNvPr>
+          <p:cNvPicPr>
+            <a:picLocks noChangeAspect="1" noChangeArrowheads="1"/>
+          </p:cNvPicPr>
+          <p:nvPr/>
+        </p:nvPicPr>
+        <p:blipFill>
+          <a:blip r:embed="rId2">
+            <a:extLst>
+              <a:ext uri="{28A0092B-C50C-407E-A947-70E740481C1C}">
+                <a14:useLocalDpi xmlns:a14="http://schemas.microsoft.com/office/drawing/2010/main" val="0"/>
+              </a:ext>
+            </a:extLst>
+          </a:blip>
+          <a:srcRect/>
+          <a:stretch>
+            <a:fillRect/>
+          </a:stretch>
+        </p:blipFill>
+        <p:spPr bwMode="auto">
+          <a:xfrm>
+            <a:off x="890588" y="0"/>
+            <a:ext cx="10410825" cy="6858000"/>
+          </a:xfrm>
+          <a:prstGeom prst="rect">
+            <a:avLst/>
+          </a:prstGeom>
+          <a:noFill/>
+          <a:extLst>
+            <a:ext uri="{909E8E84-426E-40DD-AFC4-6F175D3DCCD1}">
+              <a14:hiddenFill xmlns:a14="http://schemas.microsoft.com/office/drawing/2010/main">
+                <a:solidFill>
+                  <a:srgbClr val="FFFFFF"/>
+                </a:solidFill>
+              </a14:hiddenFill>
+            </a:ext>
+          </a:extLst>
+        </p:spPr>
+      </p:pic>
+      <p:sp>
+        <p:nvSpPr>
+          <p:cNvPr id="4" name="Rectángulo 3">
+            <a:extLst>
+              <a:ext uri="{FF2B5EF4-FFF2-40B4-BE49-F238E27FC236}">
+                <a16:creationId xmlns:a16="http://schemas.microsoft.com/office/drawing/2014/main" id="{18185899-9EDA-B7B1-77CB-738213E24BA0}"/>
+              </a:ext>
+            </a:extLst>
+          </p:cNvPr>
+          <p:cNvSpPr/>
+          <p:nvPr/>
+        </p:nvSpPr>
+        <p:spPr>
+          <a:xfrm>
+            <a:off x="2813050" y="1167618"/>
+            <a:ext cx="981515" cy="168813"/>
+          </a:xfrm>
+          <a:prstGeom prst="rect">
+            <a:avLst/>
+          </a:prstGeom>
+          <a:ln>
+            <a:noFill/>
+          </a:ln>
+        </p:spPr>
+        <p:style>
+          <a:lnRef idx="2">
+            <a:schemeClr val="accent6"/>
+          </a:lnRef>
+          <a:fillRef idx="1">
+            <a:schemeClr val="lt1"/>
+          </a:fillRef>
+          <a:effectRef idx="0">
+            <a:schemeClr val="accent6"/>
+          </a:effectRef>
+          <a:fontRef idx="minor">
+            <a:schemeClr val="dk1"/>
+          </a:fontRef>
+        </p:style>
+        <p:txBody>
+          <a:bodyPr rtlCol="0" anchor="ctr"/>
+          <a:lstStyle/>
+          <a:p>
+            <a:pPr algn="ctr"/>
+            <a:r>
+              <a:rPr lang="es-ES" sz="1000" dirty="0" err="1">
+                <a:solidFill>
+                  <a:schemeClr val="bg2">
+                    <a:lumMod val="25000"/>
+                  </a:schemeClr>
+                </a:solidFill>
+                <a:latin typeface="Abadi" panose="020B0604020104020204" pitchFamily="34" charset="0"/>
+              </a:rPr>
+              <a:t>Occurrences</a:t>
+            </a:r>
+            <a:endParaRPr lang="es-CO" sz="1000" dirty="0">
+              <a:solidFill>
+                <a:schemeClr val="bg2">
+                  <a:lumMod val="25000"/>
+                </a:schemeClr>
+              </a:solidFill>
+              <a:latin typeface="Abadi" panose="020B0604020104020204" pitchFamily="34" charset="0"/>
+            </a:endParaRPr>
+          </a:p>
+        </p:txBody>
+      </p:sp>
+      <p:sp>
+        <p:nvSpPr>
+          <p:cNvPr id="5" name="Rectángulo 4">
+            <a:extLst>
+              <a:ext uri="{FF2B5EF4-FFF2-40B4-BE49-F238E27FC236}">
+                <a16:creationId xmlns:a16="http://schemas.microsoft.com/office/drawing/2014/main" id="{EFE06D4D-EE58-AC59-030B-34CCFF360AF5}"/>
+              </a:ext>
+            </a:extLst>
+          </p:cNvPr>
+          <p:cNvSpPr/>
+          <p:nvPr/>
+        </p:nvSpPr>
+        <p:spPr>
+          <a:xfrm>
+            <a:off x="7989229" y="1193018"/>
+            <a:ext cx="1681821" cy="168813"/>
+          </a:xfrm>
+          <a:prstGeom prst="rect">
+            <a:avLst/>
+          </a:prstGeom>
+          <a:ln>
+            <a:noFill/>
+          </a:ln>
+        </p:spPr>
+        <p:style>
+          <a:lnRef idx="2">
+            <a:schemeClr val="accent6"/>
+          </a:lnRef>
+          <a:fillRef idx="1">
+            <a:schemeClr val="lt1"/>
+          </a:fillRef>
+          <a:effectRef idx="0">
+            <a:schemeClr val="accent6"/>
+          </a:effectRef>
+          <a:fontRef idx="minor">
+            <a:schemeClr val="dk1"/>
+          </a:fontRef>
+        </p:style>
+        <p:txBody>
+          <a:bodyPr rtlCol="0" anchor="ctr"/>
+          <a:lstStyle/>
+          <a:p>
+            <a:pPr algn="ctr"/>
+            <a:r>
+              <a:rPr lang="es-ES" sz="1000" dirty="0">
+                <a:solidFill>
+                  <a:schemeClr val="bg2">
+                    <a:lumMod val="25000"/>
+                  </a:schemeClr>
+                </a:solidFill>
+                <a:latin typeface="Abadi" panose="020B0604020104020204" pitchFamily="34" charset="0"/>
+              </a:rPr>
+              <a:t>Explanation variables</a:t>
+            </a:r>
+            <a:endParaRPr lang="es-CO" sz="1000" dirty="0">
+              <a:solidFill>
+                <a:schemeClr val="bg2">
+                  <a:lumMod val="25000"/>
+                </a:schemeClr>
+              </a:solidFill>
+              <a:latin typeface="Abadi" panose="020B0604020104020204" pitchFamily="34" charset="0"/>
+            </a:endParaRPr>
+          </a:p>
+        </p:txBody>
+      </p:sp>
+      <p:sp>
+        <p:nvSpPr>
+          <p:cNvPr id="6" name="Rectángulo 5">
+            <a:extLst>
+              <a:ext uri="{FF2B5EF4-FFF2-40B4-BE49-F238E27FC236}">
+                <a16:creationId xmlns:a16="http://schemas.microsoft.com/office/drawing/2014/main" id="{A82330BC-2460-688E-1ED1-E30D2E139593}"/>
+              </a:ext>
+            </a:extLst>
+          </p:cNvPr>
+          <p:cNvSpPr/>
+          <p:nvPr/>
+        </p:nvSpPr>
+        <p:spPr>
+          <a:xfrm>
+            <a:off x="10119652" y="676859"/>
+            <a:ext cx="913471" cy="379926"/>
+          </a:xfrm>
+          <a:prstGeom prst="rect">
+            <a:avLst/>
+          </a:prstGeom>
+          <a:solidFill>
+            <a:srgbClr val="E7E4E3"/>
+          </a:solidFill>
+          <a:ln>
+            <a:noFill/>
+          </a:ln>
+        </p:spPr>
+        <p:style>
+          <a:lnRef idx="2">
+            <a:schemeClr val="accent6"/>
+          </a:lnRef>
+          <a:fillRef idx="1">
+            <a:schemeClr val="lt1"/>
+          </a:fillRef>
+          <a:effectRef idx="0">
+            <a:schemeClr val="accent6"/>
+          </a:effectRef>
+          <a:fontRef idx="minor">
+            <a:schemeClr val="dk1"/>
+          </a:fontRef>
+        </p:style>
+        <p:txBody>
+          <a:bodyPr rtlCol="0" anchor="ctr"/>
+          <a:lstStyle/>
+          <a:p>
+            <a:pPr algn="ctr"/>
+            <a:r>
+              <a:rPr lang="es-ES" sz="1200" b="1" dirty="0" err="1">
+                <a:latin typeface="Arial Rounded MT Bold" panose="020F0704030504030204" pitchFamily="34" charset="0"/>
+              </a:rPr>
+              <a:t>Review</a:t>
+            </a:r>
+            <a:endParaRPr lang="es-ES" sz="1200" b="1" dirty="0">
+              <a:latin typeface="Arial Rounded MT Bold" panose="020F0704030504030204" pitchFamily="34" charset="0"/>
+            </a:endParaRPr>
+          </a:p>
+          <a:p>
+            <a:pPr algn="ctr"/>
+            <a:r>
+              <a:rPr lang="es-ES" sz="1200" b="1" dirty="0">
+                <a:latin typeface="Arial Rounded MT Bold" panose="020F0704030504030204" pitchFamily="34" charset="0"/>
+              </a:rPr>
+              <a:t>inputs</a:t>
+            </a:r>
+            <a:endParaRPr lang="es-CO" sz="1200" b="1" dirty="0">
+              <a:latin typeface="Arial Rounded MT Bold" panose="020F0704030504030204" pitchFamily="34" charset="0"/>
+            </a:endParaRPr>
+          </a:p>
+        </p:txBody>
+      </p:sp>
+      <p:sp>
+        <p:nvSpPr>
+          <p:cNvPr id="7" name="Rectángulo 6">
+            <a:extLst>
+              <a:ext uri="{FF2B5EF4-FFF2-40B4-BE49-F238E27FC236}">
+                <a16:creationId xmlns:a16="http://schemas.microsoft.com/office/drawing/2014/main" id="{4980C069-B32E-F0BC-F75C-BDDEAED7E564}"/>
+              </a:ext>
+            </a:extLst>
+          </p:cNvPr>
+          <p:cNvSpPr/>
+          <p:nvPr/>
+        </p:nvSpPr>
+        <p:spPr>
+          <a:xfrm>
+            <a:off x="9994240" y="2350574"/>
+            <a:ext cx="1164297" cy="379926"/>
+          </a:xfrm>
+          <a:prstGeom prst="rect">
+            <a:avLst/>
+          </a:prstGeom>
+          <a:solidFill>
+            <a:srgbClr val="E7E4E3"/>
+          </a:solidFill>
+          <a:ln>
+            <a:noFill/>
+          </a:ln>
+        </p:spPr>
+        <p:style>
+          <a:lnRef idx="2">
+            <a:schemeClr val="accent6"/>
+          </a:lnRef>
+          <a:fillRef idx="1">
+            <a:schemeClr val="lt1"/>
+          </a:fillRef>
+          <a:effectRef idx="0">
+            <a:schemeClr val="accent6"/>
+          </a:effectRef>
+          <a:fontRef idx="minor">
+            <a:schemeClr val="dk1"/>
+          </a:fontRef>
+        </p:style>
+        <p:txBody>
+          <a:bodyPr rtlCol="0" anchor="ctr"/>
+          <a:lstStyle/>
+          <a:p>
+            <a:pPr algn="ctr"/>
+            <a:r>
+              <a:rPr lang="es-ES" sz="1200" b="1" dirty="0">
+                <a:latin typeface="Arial Rounded MT Bold" panose="020F0704030504030204" pitchFamily="34" charset="0"/>
+              </a:rPr>
+              <a:t>Default </a:t>
+            </a:r>
+            <a:r>
+              <a:rPr lang="es-ES" sz="1200" b="1" dirty="0" err="1">
+                <a:latin typeface="Arial Rounded MT Bold" panose="020F0704030504030204" pitchFamily="34" charset="0"/>
+              </a:rPr>
+              <a:t>arguments</a:t>
+            </a:r>
+            <a:endParaRPr lang="es-CO" sz="1200" b="1" dirty="0">
+              <a:latin typeface="Arial Rounded MT Bold" panose="020F0704030504030204" pitchFamily="34" charset="0"/>
+            </a:endParaRPr>
+          </a:p>
+        </p:txBody>
+      </p:sp>
+      <p:sp>
+        <p:nvSpPr>
+          <p:cNvPr id="8" name="Rectángulo 7">
+            <a:extLst>
+              <a:ext uri="{FF2B5EF4-FFF2-40B4-BE49-F238E27FC236}">
+                <a16:creationId xmlns:a16="http://schemas.microsoft.com/office/drawing/2014/main" id="{F104F9C6-D4B9-BE47-DDF3-7D34351E1AC2}"/>
+              </a:ext>
+            </a:extLst>
+          </p:cNvPr>
+          <p:cNvSpPr/>
+          <p:nvPr/>
+        </p:nvSpPr>
+        <p:spPr>
+          <a:xfrm>
+            <a:off x="9925979" y="3685148"/>
+            <a:ext cx="1300821" cy="379926"/>
+          </a:xfrm>
+          <a:prstGeom prst="rect">
+            <a:avLst/>
+          </a:prstGeom>
+          <a:solidFill>
+            <a:srgbClr val="E7E4E3"/>
+          </a:solidFill>
+          <a:ln>
+            <a:noFill/>
+          </a:ln>
+        </p:spPr>
+        <p:style>
+          <a:lnRef idx="2">
+            <a:schemeClr val="accent6"/>
+          </a:lnRef>
+          <a:fillRef idx="1">
+            <a:schemeClr val="lt1"/>
+          </a:fillRef>
+          <a:effectRef idx="0">
+            <a:schemeClr val="accent6"/>
+          </a:effectRef>
+          <a:fontRef idx="minor">
+            <a:schemeClr val="dk1"/>
+          </a:fontRef>
+        </p:style>
+        <p:txBody>
+          <a:bodyPr rtlCol="0" anchor="ctr"/>
+          <a:lstStyle/>
+          <a:p>
+            <a:pPr algn="ctr"/>
+            <a:r>
+              <a:rPr lang="es-ES" sz="1200" b="1" dirty="0">
+                <a:latin typeface="Arial Rounded MT Bold" panose="020F0704030504030204" pitchFamily="34" charset="0"/>
+                <a:ea typeface="ADLaM Display" panose="020F0502020204030204" pitchFamily="2" charset="0"/>
+                <a:cs typeface="ADLaM Display" panose="020F0502020204030204" pitchFamily="2" charset="0"/>
+              </a:rPr>
+              <a:t>Files and </a:t>
+            </a:r>
+            <a:r>
+              <a:rPr lang="es-ES" sz="1200" b="1" dirty="0" err="1">
+                <a:latin typeface="Arial Rounded MT Bold" panose="020F0704030504030204" pitchFamily="34" charset="0"/>
+                <a:ea typeface="ADLaM Display" panose="020F0502020204030204" pitchFamily="2" charset="0"/>
+                <a:cs typeface="ADLaM Display" panose="020F0502020204030204" pitchFamily="2" charset="0"/>
+              </a:rPr>
+              <a:t>Logfile</a:t>
+            </a:r>
+            <a:r>
+              <a:rPr lang="es-ES" sz="1200" b="1" dirty="0">
+                <a:latin typeface="Arial Rounded MT Bold" panose="020F0704030504030204" pitchFamily="34" charset="0"/>
+                <a:ea typeface="ADLaM Display" panose="020F0502020204030204" pitchFamily="2" charset="0"/>
+                <a:cs typeface="ADLaM Display" panose="020F0502020204030204" pitchFamily="2" charset="0"/>
+              </a:rPr>
+              <a:t> </a:t>
+            </a:r>
+            <a:r>
+              <a:rPr lang="es-ES" sz="1200" b="1" dirty="0" err="1">
+                <a:latin typeface="Arial Rounded MT Bold" panose="020F0704030504030204" pitchFamily="34" charset="0"/>
+                <a:ea typeface="ADLaM Display" panose="020F0502020204030204" pitchFamily="2" charset="0"/>
+                <a:cs typeface="ADLaM Display" panose="020F0502020204030204" pitchFamily="2" charset="0"/>
+              </a:rPr>
+              <a:t>setup</a:t>
+            </a:r>
+            <a:endParaRPr lang="es-CO" sz="1200" b="1" dirty="0">
+              <a:latin typeface="Arial Rounded MT Bold" panose="020F0704030504030204" pitchFamily="34" charset="0"/>
+              <a:ea typeface="ADLaM Display" panose="020F0502020204030204" pitchFamily="2" charset="0"/>
+              <a:cs typeface="ADLaM Display" panose="020F0502020204030204" pitchFamily="2" charset="0"/>
+            </a:endParaRPr>
+          </a:p>
+        </p:txBody>
+      </p:sp>
+      <p:sp>
+        <p:nvSpPr>
+          <p:cNvPr id="9" name="Rectángulo 8">
+            <a:extLst>
+              <a:ext uri="{FF2B5EF4-FFF2-40B4-BE49-F238E27FC236}">
+                <a16:creationId xmlns:a16="http://schemas.microsoft.com/office/drawing/2014/main" id="{6751EB03-F427-241F-FCDE-159DE8C132ED}"/>
+              </a:ext>
+            </a:extLst>
+          </p:cNvPr>
+          <p:cNvSpPr/>
+          <p:nvPr/>
+        </p:nvSpPr>
+        <p:spPr>
+          <a:xfrm>
+            <a:off x="9964870" y="5454650"/>
+            <a:ext cx="1223033" cy="255074"/>
+          </a:xfrm>
+          <a:prstGeom prst="rect">
+            <a:avLst/>
+          </a:prstGeom>
+          <a:solidFill>
+            <a:srgbClr val="E7E4E3"/>
+          </a:solidFill>
+          <a:ln>
+            <a:noFill/>
+          </a:ln>
+        </p:spPr>
+        <p:style>
+          <a:lnRef idx="2">
+            <a:schemeClr val="accent6"/>
+          </a:lnRef>
+          <a:fillRef idx="1">
+            <a:schemeClr val="lt1"/>
+          </a:fillRef>
+          <a:effectRef idx="0">
+            <a:schemeClr val="accent6"/>
+          </a:effectRef>
+          <a:fontRef idx="minor">
+            <a:schemeClr val="dk1"/>
+          </a:fontRef>
+        </p:style>
+        <p:txBody>
+          <a:bodyPr rtlCol="0" anchor="ctr"/>
+          <a:lstStyle/>
+          <a:p>
+            <a:pPr algn="ctr"/>
+            <a:r>
+              <a:rPr lang="es-ES" sz="1200" b="1" dirty="0" err="1">
+                <a:latin typeface="Arial Rounded MT Bold" panose="020F0704030504030204" pitchFamily="34" charset="0"/>
+                <a:ea typeface="ADLaM Display" panose="020F0502020204030204" pitchFamily="2" charset="0"/>
+                <a:cs typeface="ADLaM Display" panose="020F0502020204030204" pitchFamily="2" charset="0"/>
+              </a:rPr>
+              <a:t>Cleaning</a:t>
+            </a:r>
+            <a:r>
+              <a:rPr lang="es-ES" sz="1200" b="1" dirty="0">
+                <a:latin typeface="Arial Rounded MT Bold" panose="020F0704030504030204" pitchFamily="34" charset="0"/>
+                <a:ea typeface="ADLaM Display" panose="020F0502020204030204" pitchFamily="2" charset="0"/>
+                <a:cs typeface="ADLaM Display" panose="020F0502020204030204" pitchFamily="2" charset="0"/>
+              </a:rPr>
+              <a:t> files</a:t>
+            </a:r>
+            <a:endParaRPr lang="es-CO" sz="1200" b="1" dirty="0">
+              <a:latin typeface="Arial Rounded MT Bold" panose="020F0704030504030204" pitchFamily="34" charset="0"/>
+              <a:ea typeface="ADLaM Display" panose="020F0502020204030204" pitchFamily="2" charset="0"/>
+              <a:cs typeface="ADLaM Display" panose="020F0502020204030204" pitchFamily="2" charset="0"/>
+            </a:endParaRPr>
+          </a:p>
+        </p:txBody>
+      </p:sp>
+      <p:sp>
+        <p:nvSpPr>
+          <p:cNvPr id="10" name="Rectángulo 9">
+            <a:extLst>
+              <a:ext uri="{FF2B5EF4-FFF2-40B4-BE49-F238E27FC236}">
+                <a16:creationId xmlns:a16="http://schemas.microsoft.com/office/drawing/2014/main" id="{E3B5FDFE-94F7-51B3-2EE5-123B1BCBD0C6}"/>
+              </a:ext>
+            </a:extLst>
+          </p:cNvPr>
+          <p:cNvSpPr/>
+          <p:nvPr/>
+        </p:nvSpPr>
+        <p:spPr>
+          <a:xfrm>
+            <a:off x="985970" y="5881174"/>
+            <a:ext cx="1223033" cy="255074"/>
+          </a:xfrm>
+          <a:prstGeom prst="rect">
+            <a:avLst/>
+          </a:prstGeom>
+          <a:solidFill>
+            <a:schemeClr val="bg1"/>
+          </a:solidFill>
+          <a:ln>
+            <a:noFill/>
+          </a:ln>
+        </p:spPr>
+        <p:style>
+          <a:lnRef idx="2">
+            <a:schemeClr val="accent6"/>
+          </a:lnRef>
+          <a:fillRef idx="1">
+            <a:schemeClr val="lt1"/>
+          </a:fillRef>
+          <a:effectRef idx="0">
+            <a:schemeClr val="accent6"/>
+          </a:effectRef>
+          <a:fontRef idx="minor">
+            <a:schemeClr val="dk1"/>
+          </a:fontRef>
+        </p:style>
+        <p:txBody>
+          <a:bodyPr rtlCol="0" anchor="ctr"/>
+          <a:lstStyle/>
+          <a:p>
+            <a:pPr algn="ctr"/>
+            <a:r>
+              <a:rPr lang="es-ES" sz="1100" b="1" dirty="0">
+                <a:latin typeface="Arial Rounded MT Bold" panose="020F0704030504030204" pitchFamily="34" charset="0"/>
+                <a:ea typeface="ADLaM Display" panose="020F0502020204030204" pitchFamily="2" charset="0"/>
+                <a:cs typeface="Arial" panose="020B0604020202020204" pitchFamily="34" charset="0"/>
+              </a:rPr>
+              <a:t>Ensemble</a:t>
+            </a:r>
+            <a:endParaRPr lang="es-CO" sz="1100" b="1" dirty="0">
+              <a:latin typeface="Arial Rounded MT Bold" panose="020F0704030504030204" pitchFamily="34" charset="0"/>
+              <a:ea typeface="ADLaM Display" panose="020F0502020204030204" pitchFamily="2" charset="0"/>
+              <a:cs typeface="Arial" panose="020B0604020202020204" pitchFamily="34" charset="0"/>
+            </a:endParaRPr>
+          </a:p>
+        </p:txBody>
+      </p:sp>
+      <p:sp>
+        <p:nvSpPr>
+          <p:cNvPr id="11" name="Rectángulo 10">
+            <a:extLst>
+              <a:ext uri="{FF2B5EF4-FFF2-40B4-BE49-F238E27FC236}">
+                <a16:creationId xmlns:a16="http://schemas.microsoft.com/office/drawing/2014/main" id="{AE9FEC2C-D203-CC7A-033E-0D2C575C4514}"/>
+              </a:ext>
+            </a:extLst>
+          </p:cNvPr>
+          <p:cNvSpPr/>
+          <p:nvPr/>
+        </p:nvSpPr>
+        <p:spPr>
+          <a:xfrm>
+            <a:off x="985970" y="4065074"/>
+            <a:ext cx="1223033" cy="379926"/>
+          </a:xfrm>
+          <a:prstGeom prst="rect">
+            <a:avLst/>
+          </a:prstGeom>
+          <a:solidFill>
+            <a:srgbClr val="D84839"/>
+          </a:solidFill>
+          <a:ln>
+            <a:noFill/>
+          </a:ln>
+        </p:spPr>
+        <p:style>
+          <a:lnRef idx="2">
+            <a:schemeClr val="accent6"/>
+          </a:lnRef>
+          <a:fillRef idx="1">
+            <a:schemeClr val="lt1"/>
+          </a:fillRef>
+          <a:effectRef idx="0">
+            <a:schemeClr val="accent6"/>
+          </a:effectRef>
+          <a:fontRef idx="minor">
+            <a:schemeClr val="dk1"/>
+          </a:fontRef>
+        </p:style>
+        <p:txBody>
+          <a:bodyPr rtlCol="0" anchor="ctr"/>
+          <a:lstStyle/>
+          <a:p>
+            <a:pPr algn="ctr"/>
+            <a:r>
+              <a:rPr lang="es-ES" sz="1100" b="1" dirty="0">
+                <a:solidFill>
+                  <a:schemeClr val="bg1"/>
+                </a:solidFill>
+                <a:latin typeface="Arial Rounded MT Bold" panose="020F0704030504030204" pitchFamily="34" charset="0"/>
+                <a:ea typeface="ADLaM Display" panose="020F0502020204030204" pitchFamily="2" charset="0"/>
+                <a:cs typeface="Arial" panose="020B0604020202020204" pitchFamily="34" charset="0"/>
+              </a:rPr>
+              <a:t>Training and </a:t>
+            </a:r>
+            <a:r>
+              <a:rPr lang="es-ES" sz="1100" b="1" dirty="0" err="1">
+                <a:solidFill>
+                  <a:schemeClr val="bg1"/>
+                </a:solidFill>
+                <a:latin typeface="Arial Rounded MT Bold" panose="020F0704030504030204" pitchFamily="34" charset="0"/>
+                <a:ea typeface="ADLaM Display" panose="020F0502020204030204" pitchFamily="2" charset="0"/>
+                <a:cs typeface="Arial" panose="020B0604020202020204" pitchFamily="34" charset="0"/>
+              </a:rPr>
+              <a:t>evaluation</a:t>
+            </a:r>
+            <a:endParaRPr lang="es-CO" sz="1100" b="1" dirty="0">
+              <a:solidFill>
+                <a:schemeClr val="bg1"/>
+              </a:solidFill>
+              <a:latin typeface="Arial Rounded MT Bold" panose="020F0704030504030204" pitchFamily="34" charset="0"/>
+              <a:ea typeface="ADLaM Display" panose="020F0502020204030204" pitchFamily="2" charset="0"/>
+              <a:cs typeface="Arial" panose="020B0604020202020204" pitchFamily="34" charset="0"/>
+            </a:endParaRPr>
+          </a:p>
+        </p:txBody>
+      </p:sp>
+      <p:sp>
+        <p:nvSpPr>
+          <p:cNvPr id="12" name="Rectángulo 11">
+            <a:extLst>
+              <a:ext uri="{FF2B5EF4-FFF2-40B4-BE49-F238E27FC236}">
+                <a16:creationId xmlns:a16="http://schemas.microsoft.com/office/drawing/2014/main" id="{7B1C9730-1271-59FB-CE8F-C4C9004931FD}"/>
+              </a:ext>
+            </a:extLst>
+          </p:cNvPr>
+          <p:cNvSpPr/>
+          <p:nvPr/>
+        </p:nvSpPr>
+        <p:spPr>
+          <a:xfrm>
+            <a:off x="985969" y="2456376"/>
+            <a:ext cx="1223033" cy="255074"/>
+          </a:xfrm>
+          <a:prstGeom prst="rect">
+            <a:avLst/>
+          </a:prstGeom>
+          <a:solidFill>
+            <a:schemeClr val="bg1"/>
+          </a:solidFill>
+          <a:ln>
+            <a:noFill/>
+          </a:ln>
+        </p:spPr>
+        <p:style>
+          <a:lnRef idx="2">
+            <a:schemeClr val="accent6"/>
+          </a:lnRef>
+          <a:fillRef idx="1">
+            <a:schemeClr val="lt1"/>
+          </a:fillRef>
+          <a:effectRef idx="0">
+            <a:schemeClr val="accent6"/>
+          </a:effectRef>
+          <a:fontRef idx="minor">
+            <a:schemeClr val="dk1"/>
+          </a:fontRef>
+        </p:style>
+        <p:txBody>
+          <a:bodyPr rtlCol="0" anchor="ctr"/>
+          <a:lstStyle/>
+          <a:p>
+            <a:pPr algn="ctr"/>
+            <a:r>
+              <a:rPr lang="es-ES" sz="1100" b="1" dirty="0">
+                <a:latin typeface="Arial Rounded MT Bold" panose="020F0704030504030204" pitchFamily="34" charset="0"/>
+                <a:ea typeface="ADLaM Display" panose="020F0502020204030204" pitchFamily="2" charset="0"/>
+                <a:cs typeface="Arial" panose="020B0604020202020204" pitchFamily="34" charset="0"/>
+              </a:rPr>
+              <a:t>Processing</a:t>
+            </a:r>
+            <a:endParaRPr lang="es-CO" sz="1100" b="1" dirty="0">
+              <a:latin typeface="Arial Rounded MT Bold" panose="020F0704030504030204" pitchFamily="34" charset="0"/>
+              <a:ea typeface="ADLaM Display" panose="020F0502020204030204" pitchFamily="2" charset="0"/>
+              <a:cs typeface="Arial" panose="020B0604020202020204" pitchFamily="34" charset="0"/>
+            </a:endParaRPr>
+          </a:p>
+        </p:txBody>
+      </p:sp>
+      <p:sp>
+        <p:nvSpPr>
+          <p:cNvPr id="13" name="Rectángulo 12">
+            <a:extLst>
+              <a:ext uri="{FF2B5EF4-FFF2-40B4-BE49-F238E27FC236}">
+                <a16:creationId xmlns:a16="http://schemas.microsoft.com/office/drawing/2014/main" id="{F08676FF-845D-0207-9CAB-BF5D354918D8}"/>
+              </a:ext>
+            </a:extLst>
+          </p:cNvPr>
+          <p:cNvSpPr/>
+          <p:nvPr/>
+        </p:nvSpPr>
+        <p:spPr>
+          <a:xfrm>
+            <a:off x="2425700" y="2786868"/>
+            <a:ext cx="981515" cy="168813"/>
+          </a:xfrm>
+          <a:prstGeom prst="rect">
+            <a:avLst/>
+          </a:prstGeom>
+          <a:solidFill>
+            <a:srgbClr val="FFFACD"/>
+          </a:solidFill>
+          <a:ln>
+            <a:noFill/>
+          </a:ln>
+        </p:spPr>
+        <p:style>
+          <a:lnRef idx="2">
+            <a:schemeClr val="accent6"/>
+          </a:lnRef>
+          <a:fillRef idx="1">
+            <a:schemeClr val="lt1"/>
+          </a:fillRef>
+          <a:effectRef idx="0">
+            <a:schemeClr val="accent6"/>
+          </a:effectRef>
+          <a:fontRef idx="minor">
+            <a:schemeClr val="dk1"/>
+          </a:fontRef>
+        </p:style>
+        <p:txBody>
+          <a:bodyPr rtlCol="0" anchor="ctr"/>
+          <a:lstStyle/>
+          <a:p>
+            <a:pPr algn="ctr"/>
+            <a:r>
+              <a:rPr lang="es-ES" sz="1000" dirty="0" err="1">
+                <a:solidFill>
+                  <a:schemeClr val="bg2">
+                    <a:lumMod val="10000"/>
+                  </a:schemeClr>
+                </a:solidFill>
+                <a:latin typeface="Abadi" panose="020B0604020104020204" pitchFamily="34" charset="0"/>
+              </a:rPr>
+              <a:t>Formatting</a:t>
+            </a:r>
+            <a:endParaRPr lang="es-CO" sz="1000" dirty="0">
+              <a:solidFill>
+                <a:schemeClr val="bg2">
+                  <a:lumMod val="10000"/>
+                </a:schemeClr>
+              </a:solidFill>
+              <a:latin typeface="Abadi" panose="020B0604020104020204" pitchFamily="34" charset="0"/>
+            </a:endParaRPr>
+          </a:p>
+        </p:txBody>
+      </p:sp>
+      <p:sp>
+        <p:nvSpPr>
+          <p:cNvPr id="14" name="Rectángulo 13">
+            <a:extLst>
+              <a:ext uri="{FF2B5EF4-FFF2-40B4-BE49-F238E27FC236}">
+                <a16:creationId xmlns:a16="http://schemas.microsoft.com/office/drawing/2014/main" id="{A10BEE38-5802-2E9D-8B46-F7C7963DF674}"/>
+              </a:ext>
+            </a:extLst>
+          </p:cNvPr>
+          <p:cNvSpPr/>
+          <p:nvPr/>
+        </p:nvSpPr>
+        <p:spPr>
+          <a:xfrm>
+            <a:off x="3508811" y="2795074"/>
+            <a:ext cx="981515" cy="329126"/>
+          </a:xfrm>
+          <a:prstGeom prst="rect">
+            <a:avLst/>
+          </a:prstGeom>
+          <a:solidFill>
+            <a:srgbClr val="FFFACD"/>
+          </a:solidFill>
+          <a:ln>
+            <a:noFill/>
+          </a:ln>
+        </p:spPr>
+        <p:style>
+          <a:lnRef idx="2">
+            <a:schemeClr val="accent6"/>
+          </a:lnRef>
+          <a:fillRef idx="1">
+            <a:schemeClr val="lt1"/>
+          </a:fillRef>
+          <a:effectRef idx="0">
+            <a:schemeClr val="accent6"/>
+          </a:effectRef>
+          <a:fontRef idx="minor">
+            <a:schemeClr val="dk1"/>
+          </a:fontRef>
+        </p:style>
+        <p:txBody>
+          <a:bodyPr rtlCol="0" anchor="ctr"/>
+          <a:lstStyle/>
+          <a:p>
+            <a:pPr algn="ctr"/>
+            <a:r>
+              <a:rPr lang="es-ES" sz="1000" dirty="0" err="1">
+                <a:solidFill>
+                  <a:schemeClr val="bg2">
+                    <a:lumMod val="10000"/>
+                  </a:schemeClr>
+                </a:solidFill>
+                <a:latin typeface="Abadi" panose="020B0604020104020204" pitchFamily="34" charset="0"/>
+              </a:rPr>
+              <a:t>Duplicate</a:t>
+            </a:r>
+            <a:endParaRPr lang="es-ES" sz="1000" dirty="0">
+              <a:solidFill>
+                <a:schemeClr val="bg2">
+                  <a:lumMod val="10000"/>
+                </a:schemeClr>
+              </a:solidFill>
+              <a:latin typeface="Abadi" panose="020B0604020104020204" pitchFamily="34" charset="0"/>
+            </a:endParaRPr>
+          </a:p>
+          <a:p>
+            <a:pPr algn="ctr"/>
+            <a:r>
+              <a:rPr lang="es-ES" sz="1000" dirty="0" err="1">
+                <a:solidFill>
+                  <a:schemeClr val="bg2">
+                    <a:lumMod val="10000"/>
+                  </a:schemeClr>
+                </a:solidFill>
+                <a:latin typeface="Abadi" panose="020B0604020104020204" pitchFamily="34" charset="0"/>
+              </a:rPr>
+              <a:t>remotion</a:t>
+            </a:r>
+            <a:endParaRPr lang="es-CO" sz="1000" dirty="0">
+              <a:solidFill>
+                <a:schemeClr val="bg2">
+                  <a:lumMod val="10000"/>
+                </a:schemeClr>
+              </a:solidFill>
+              <a:latin typeface="Abadi" panose="020B0604020104020204" pitchFamily="34" charset="0"/>
+            </a:endParaRPr>
+          </a:p>
+        </p:txBody>
+      </p:sp>
+      <p:sp>
+        <p:nvSpPr>
+          <p:cNvPr id="15" name="Rectángulo 14">
+            <a:extLst>
+              <a:ext uri="{FF2B5EF4-FFF2-40B4-BE49-F238E27FC236}">
+                <a16:creationId xmlns:a16="http://schemas.microsoft.com/office/drawing/2014/main" id="{C80A1502-63AD-67FE-FEFB-57AB584D4C79}"/>
+              </a:ext>
+            </a:extLst>
+          </p:cNvPr>
+          <p:cNvSpPr/>
+          <p:nvPr/>
+        </p:nvSpPr>
+        <p:spPr>
+          <a:xfrm>
+            <a:off x="4620061" y="2857256"/>
+            <a:ext cx="1136650" cy="196850"/>
+          </a:xfrm>
+          <a:prstGeom prst="rect">
+            <a:avLst/>
+          </a:prstGeom>
+          <a:solidFill>
+            <a:srgbClr val="FFFACD"/>
+          </a:solidFill>
+          <a:ln>
+            <a:noFill/>
+          </a:ln>
+        </p:spPr>
+        <p:style>
+          <a:lnRef idx="2">
+            <a:schemeClr val="accent6"/>
+          </a:lnRef>
+          <a:fillRef idx="1">
+            <a:schemeClr val="lt1"/>
+          </a:fillRef>
+          <a:effectRef idx="0">
+            <a:schemeClr val="accent6"/>
+          </a:effectRef>
+          <a:fontRef idx="minor">
+            <a:schemeClr val="dk1"/>
+          </a:fontRef>
+        </p:style>
+        <p:txBody>
+          <a:bodyPr rtlCol="0" anchor="ctr"/>
+          <a:lstStyle/>
+          <a:p>
+            <a:pPr algn="ctr"/>
+            <a:r>
+              <a:rPr lang="es-ES" sz="1000" dirty="0" err="1">
+                <a:solidFill>
+                  <a:schemeClr val="bg2">
+                    <a:lumMod val="10000"/>
+                  </a:schemeClr>
+                </a:solidFill>
+                <a:latin typeface="Abadi" panose="020B0604020104020204" pitchFamily="34" charset="0"/>
+              </a:rPr>
+              <a:t>Bias</a:t>
+            </a:r>
+            <a:r>
+              <a:rPr lang="es-ES" sz="1000" dirty="0">
+                <a:solidFill>
+                  <a:schemeClr val="bg2">
+                    <a:lumMod val="10000"/>
+                  </a:schemeClr>
+                </a:solidFill>
+                <a:latin typeface="Abadi" panose="020B0604020104020204" pitchFamily="34" charset="0"/>
+              </a:rPr>
+              <a:t> </a:t>
+            </a:r>
+            <a:r>
+              <a:rPr lang="es-ES" sz="1000" dirty="0" err="1">
+                <a:solidFill>
+                  <a:schemeClr val="bg2">
+                    <a:lumMod val="10000"/>
+                  </a:schemeClr>
+                </a:solidFill>
+                <a:latin typeface="Abadi" panose="020B0604020104020204" pitchFamily="34" charset="0"/>
+              </a:rPr>
+              <a:t>management</a:t>
+            </a:r>
+            <a:endParaRPr lang="es-CO" sz="1000" dirty="0">
+              <a:solidFill>
+                <a:schemeClr val="bg2">
+                  <a:lumMod val="10000"/>
+                </a:schemeClr>
+              </a:solidFill>
+              <a:latin typeface="Abadi" panose="020B0604020104020204" pitchFamily="34" charset="0"/>
+            </a:endParaRPr>
+          </a:p>
+        </p:txBody>
+      </p:sp>
+      <p:sp>
+        <p:nvSpPr>
+          <p:cNvPr id="16" name="Rectángulo 15">
+            <a:extLst>
+              <a:ext uri="{FF2B5EF4-FFF2-40B4-BE49-F238E27FC236}">
+                <a16:creationId xmlns:a16="http://schemas.microsoft.com/office/drawing/2014/main" id="{C850BFEE-4C8D-22DB-1386-D48591A8CA9A}"/>
+              </a:ext>
+            </a:extLst>
+          </p:cNvPr>
+          <p:cNvSpPr/>
+          <p:nvPr/>
+        </p:nvSpPr>
+        <p:spPr>
+          <a:xfrm>
+            <a:off x="5855138" y="2852224"/>
+            <a:ext cx="1136650" cy="329126"/>
+          </a:xfrm>
+          <a:prstGeom prst="rect">
+            <a:avLst/>
+          </a:prstGeom>
+          <a:solidFill>
+            <a:srgbClr val="FFFACD"/>
+          </a:solidFill>
+          <a:ln>
+            <a:noFill/>
+          </a:ln>
+        </p:spPr>
+        <p:style>
+          <a:lnRef idx="2">
+            <a:schemeClr val="accent6"/>
+          </a:lnRef>
+          <a:fillRef idx="1">
+            <a:schemeClr val="lt1"/>
+          </a:fillRef>
+          <a:effectRef idx="0">
+            <a:schemeClr val="accent6"/>
+          </a:effectRef>
+          <a:fontRef idx="minor">
+            <a:schemeClr val="dk1"/>
+          </a:fontRef>
+        </p:style>
+        <p:txBody>
+          <a:bodyPr rtlCol="0" anchor="ctr"/>
+          <a:lstStyle/>
+          <a:p>
+            <a:pPr algn="ctr"/>
+            <a:r>
+              <a:rPr lang="es-ES" sz="1000" dirty="0" err="1">
+                <a:solidFill>
+                  <a:schemeClr val="bg2">
+                    <a:lumMod val="10000"/>
+                  </a:schemeClr>
+                </a:solidFill>
+                <a:latin typeface="Abadi" panose="020B0604020104020204" pitchFamily="34" charset="0"/>
+              </a:rPr>
+              <a:t>Area</a:t>
+            </a:r>
+            <a:r>
+              <a:rPr lang="es-ES" sz="1000" dirty="0">
+                <a:solidFill>
+                  <a:schemeClr val="bg2">
+                    <a:lumMod val="10000"/>
+                  </a:schemeClr>
+                </a:solidFill>
+                <a:latin typeface="Abadi" panose="020B0604020104020204" pitchFamily="34" charset="0"/>
+              </a:rPr>
+              <a:t> </a:t>
+            </a:r>
+            <a:r>
+              <a:rPr lang="es-ES" sz="1000" dirty="0" err="1">
+                <a:solidFill>
+                  <a:schemeClr val="bg2">
+                    <a:lumMod val="10000"/>
+                  </a:schemeClr>
+                </a:solidFill>
+                <a:latin typeface="Abadi" panose="020B0604020104020204" pitchFamily="34" charset="0"/>
+              </a:rPr>
+              <a:t>of</a:t>
+            </a:r>
+            <a:r>
+              <a:rPr lang="es-ES" sz="1000" dirty="0">
+                <a:solidFill>
+                  <a:schemeClr val="bg2">
+                    <a:lumMod val="10000"/>
+                  </a:schemeClr>
+                </a:solidFill>
+                <a:latin typeface="Abadi" panose="020B0604020104020204" pitchFamily="34" charset="0"/>
+              </a:rPr>
+              <a:t> </a:t>
+            </a:r>
+            <a:r>
+              <a:rPr lang="es-ES" sz="1000" dirty="0" err="1">
+                <a:solidFill>
+                  <a:schemeClr val="bg2">
+                    <a:lumMod val="10000"/>
+                  </a:schemeClr>
+                </a:solidFill>
+                <a:latin typeface="Abadi" panose="020B0604020104020204" pitchFamily="34" charset="0"/>
+              </a:rPr>
+              <a:t>interest</a:t>
+            </a:r>
+            <a:r>
+              <a:rPr lang="es-ES" sz="1000" dirty="0">
+                <a:solidFill>
+                  <a:schemeClr val="bg2">
+                    <a:lumMod val="10000"/>
+                  </a:schemeClr>
+                </a:solidFill>
+                <a:latin typeface="Abadi" panose="020B0604020104020204" pitchFamily="34" charset="0"/>
+              </a:rPr>
+              <a:t> </a:t>
+            </a:r>
+            <a:r>
+              <a:rPr lang="es-ES" sz="1000" dirty="0" err="1">
+                <a:solidFill>
+                  <a:schemeClr val="bg2">
+                    <a:lumMod val="10000"/>
+                  </a:schemeClr>
+                </a:solidFill>
+                <a:latin typeface="Abadi" panose="020B0604020104020204" pitchFamily="34" charset="0"/>
+              </a:rPr>
+              <a:t>creation</a:t>
+            </a:r>
+            <a:endParaRPr lang="es-CO" sz="1000" dirty="0">
+              <a:solidFill>
+                <a:schemeClr val="bg2">
+                  <a:lumMod val="10000"/>
+                </a:schemeClr>
+              </a:solidFill>
+              <a:latin typeface="Abadi" panose="020B0604020104020204" pitchFamily="34" charset="0"/>
+            </a:endParaRPr>
+          </a:p>
+        </p:txBody>
+      </p:sp>
+      <p:sp>
+        <p:nvSpPr>
+          <p:cNvPr id="17" name="Rectángulo 16">
+            <a:extLst>
+              <a:ext uri="{FF2B5EF4-FFF2-40B4-BE49-F238E27FC236}">
+                <a16:creationId xmlns:a16="http://schemas.microsoft.com/office/drawing/2014/main" id="{331AA534-C41E-3D3E-E729-DFB3FBE13955}"/>
+              </a:ext>
+            </a:extLst>
+          </p:cNvPr>
+          <p:cNvSpPr/>
+          <p:nvPr/>
+        </p:nvSpPr>
+        <p:spPr>
+          <a:xfrm>
+            <a:off x="7226738" y="2815198"/>
+            <a:ext cx="984250" cy="423302"/>
+          </a:xfrm>
+          <a:prstGeom prst="rect">
+            <a:avLst/>
+          </a:prstGeom>
+          <a:solidFill>
+            <a:srgbClr val="FFFACD"/>
+          </a:solidFill>
+          <a:ln>
+            <a:noFill/>
+          </a:ln>
+        </p:spPr>
+        <p:style>
+          <a:lnRef idx="2">
+            <a:schemeClr val="accent6"/>
+          </a:lnRef>
+          <a:fillRef idx="1">
+            <a:schemeClr val="lt1"/>
+          </a:fillRef>
+          <a:effectRef idx="0">
+            <a:schemeClr val="accent6"/>
+          </a:effectRef>
+          <a:fontRef idx="minor">
+            <a:schemeClr val="dk1"/>
+          </a:fontRef>
+        </p:style>
+        <p:txBody>
+          <a:bodyPr rtlCol="0" anchor="ctr"/>
+          <a:lstStyle/>
+          <a:p>
+            <a:pPr algn="ctr"/>
+            <a:r>
+              <a:rPr lang="es-ES" sz="1000" dirty="0">
+                <a:solidFill>
+                  <a:schemeClr val="bg2">
+                    <a:lumMod val="10000"/>
+                  </a:schemeClr>
+                </a:solidFill>
+                <a:latin typeface="Abadi" panose="020B0604020104020204" pitchFamily="34" charset="0"/>
+              </a:rPr>
+              <a:t>Variable </a:t>
+            </a:r>
+            <a:r>
+              <a:rPr lang="es-ES" sz="1000" dirty="0" err="1">
+                <a:solidFill>
+                  <a:schemeClr val="bg2">
+                    <a:lumMod val="10000"/>
+                  </a:schemeClr>
+                </a:solidFill>
+                <a:latin typeface="Abadi" panose="020B0604020104020204" pitchFamily="34" charset="0"/>
+              </a:rPr>
+              <a:t>masking</a:t>
+            </a:r>
+            <a:endParaRPr lang="es-CO" sz="1000" dirty="0">
+              <a:solidFill>
+                <a:schemeClr val="bg2">
+                  <a:lumMod val="10000"/>
+                </a:schemeClr>
+              </a:solidFill>
+              <a:latin typeface="Abadi" panose="020B0604020104020204" pitchFamily="34" charset="0"/>
+            </a:endParaRPr>
+          </a:p>
+        </p:txBody>
+      </p:sp>
+      <p:sp>
+        <p:nvSpPr>
+          <p:cNvPr id="18" name="Rectángulo 17">
+            <a:extLst>
+              <a:ext uri="{FF2B5EF4-FFF2-40B4-BE49-F238E27FC236}">
+                <a16:creationId xmlns:a16="http://schemas.microsoft.com/office/drawing/2014/main" id="{435560F9-1ED3-C07E-DC42-2FB37A71B3FB}"/>
+              </a:ext>
+            </a:extLst>
+          </p:cNvPr>
+          <p:cNvSpPr/>
+          <p:nvPr/>
+        </p:nvSpPr>
+        <p:spPr>
+          <a:xfrm>
+            <a:off x="8249088" y="2871274"/>
+            <a:ext cx="1517212" cy="211651"/>
+          </a:xfrm>
+          <a:prstGeom prst="rect">
+            <a:avLst/>
+          </a:prstGeom>
+          <a:solidFill>
+            <a:srgbClr val="FFFACD"/>
+          </a:solidFill>
+          <a:ln>
+            <a:noFill/>
+          </a:ln>
+        </p:spPr>
+        <p:style>
+          <a:lnRef idx="2">
+            <a:schemeClr val="accent6"/>
+          </a:lnRef>
+          <a:fillRef idx="1">
+            <a:schemeClr val="lt1"/>
+          </a:fillRef>
+          <a:effectRef idx="0">
+            <a:schemeClr val="accent6"/>
+          </a:effectRef>
+          <a:fontRef idx="minor">
+            <a:schemeClr val="dk1"/>
+          </a:fontRef>
+        </p:style>
+        <p:txBody>
+          <a:bodyPr rtlCol="0" anchor="ctr"/>
+          <a:lstStyle/>
+          <a:p>
+            <a:pPr algn="ctr"/>
+            <a:r>
+              <a:rPr lang="es-ES" sz="1000" dirty="0" err="1">
+                <a:solidFill>
+                  <a:schemeClr val="bg2">
+                    <a:lumMod val="10000"/>
+                  </a:schemeClr>
+                </a:solidFill>
+                <a:latin typeface="Abadi" panose="020B0604020104020204" pitchFamily="34" charset="0"/>
+              </a:rPr>
+              <a:t>Correlation</a:t>
+            </a:r>
+            <a:r>
+              <a:rPr lang="es-ES" sz="1000" dirty="0">
+                <a:solidFill>
+                  <a:schemeClr val="bg2">
+                    <a:lumMod val="10000"/>
+                  </a:schemeClr>
+                </a:solidFill>
+                <a:latin typeface="Abadi" panose="020B0604020104020204" pitchFamily="34" charset="0"/>
+              </a:rPr>
+              <a:t> </a:t>
+            </a:r>
+            <a:r>
+              <a:rPr lang="es-ES" sz="1000" dirty="0" err="1">
+                <a:solidFill>
+                  <a:schemeClr val="bg2">
+                    <a:lumMod val="10000"/>
+                  </a:schemeClr>
+                </a:solidFill>
+                <a:latin typeface="Abadi" panose="020B0604020104020204" pitchFamily="34" charset="0"/>
+              </a:rPr>
+              <a:t>management</a:t>
+            </a:r>
+            <a:endParaRPr lang="es-CO" sz="1000" dirty="0">
+              <a:solidFill>
+                <a:schemeClr val="bg2">
+                  <a:lumMod val="10000"/>
+                </a:schemeClr>
+              </a:solidFill>
+              <a:latin typeface="Abadi" panose="020B0604020104020204" pitchFamily="34" charset="0"/>
+            </a:endParaRPr>
+          </a:p>
+        </p:txBody>
+      </p:sp>
+      <p:sp>
+        <p:nvSpPr>
+          <p:cNvPr id="19" name="Rectángulo 18">
+            <a:extLst>
+              <a:ext uri="{FF2B5EF4-FFF2-40B4-BE49-F238E27FC236}">
+                <a16:creationId xmlns:a16="http://schemas.microsoft.com/office/drawing/2014/main" id="{98B58B98-E646-FA59-90C1-EAF8FED28418}"/>
+              </a:ext>
+            </a:extLst>
+          </p:cNvPr>
+          <p:cNvSpPr/>
+          <p:nvPr/>
+        </p:nvSpPr>
+        <p:spPr>
+          <a:xfrm>
+            <a:off x="8112618" y="4622017"/>
+            <a:ext cx="1681821" cy="356383"/>
+          </a:xfrm>
+          <a:prstGeom prst="rect">
+            <a:avLst/>
+          </a:prstGeom>
+          <a:ln>
+            <a:noFill/>
+          </a:ln>
+        </p:spPr>
+        <p:style>
+          <a:lnRef idx="2">
+            <a:schemeClr val="accent6"/>
+          </a:lnRef>
+          <a:fillRef idx="1">
+            <a:schemeClr val="lt1"/>
+          </a:fillRef>
+          <a:effectRef idx="0">
+            <a:schemeClr val="accent6"/>
+          </a:effectRef>
+          <a:fontRef idx="minor">
+            <a:schemeClr val="dk1"/>
+          </a:fontRef>
+        </p:style>
+        <p:txBody>
+          <a:bodyPr rtlCol="0" anchor="ctr"/>
+          <a:lstStyle/>
+          <a:p>
+            <a:pPr algn="ctr"/>
+            <a:r>
+              <a:rPr lang="es-ES" sz="1000" dirty="0" err="1">
+                <a:solidFill>
+                  <a:schemeClr val="bg2">
+                    <a:lumMod val="25000"/>
+                  </a:schemeClr>
+                </a:solidFill>
+                <a:latin typeface="Abadi" panose="020B0604020104020204" pitchFamily="34" charset="0"/>
+              </a:rPr>
+              <a:t>Spatial</a:t>
+            </a:r>
+            <a:r>
+              <a:rPr lang="es-ES" sz="1000" dirty="0">
+                <a:solidFill>
+                  <a:schemeClr val="bg2">
+                    <a:lumMod val="25000"/>
+                  </a:schemeClr>
+                </a:solidFill>
+                <a:latin typeface="Abadi" panose="020B0604020104020204" pitchFamily="34" charset="0"/>
+              </a:rPr>
+              <a:t> and temporal </a:t>
+            </a:r>
+            <a:r>
+              <a:rPr lang="es-ES" sz="1000" dirty="0" err="1">
+                <a:solidFill>
+                  <a:schemeClr val="bg2">
+                    <a:lumMod val="25000"/>
+                  </a:schemeClr>
+                </a:solidFill>
+                <a:latin typeface="Abadi" panose="020B0604020104020204" pitchFamily="34" charset="0"/>
+              </a:rPr>
+              <a:t>transferency</a:t>
+            </a:r>
+            <a:endParaRPr lang="es-CO" sz="1000" dirty="0">
+              <a:solidFill>
+                <a:schemeClr val="bg2">
+                  <a:lumMod val="25000"/>
+                </a:schemeClr>
+              </a:solidFill>
+              <a:latin typeface="Abadi" panose="020B0604020104020204" pitchFamily="34" charset="0"/>
+            </a:endParaRPr>
+          </a:p>
+        </p:txBody>
+      </p:sp>
+      <p:sp>
+        <p:nvSpPr>
+          <p:cNvPr id="20" name="Rectángulo 19">
+            <a:extLst>
+              <a:ext uri="{FF2B5EF4-FFF2-40B4-BE49-F238E27FC236}">
+                <a16:creationId xmlns:a16="http://schemas.microsoft.com/office/drawing/2014/main" id="{E61D0C50-2F3A-8940-CA88-C453A5FC5EB8}"/>
+              </a:ext>
+            </a:extLst>
+          </p:cNvPr>
+          <p:cNvSpPr/>
+          <p:nvPr/>
+        </p:nvSpPr>
+        <p:spPr>
+          <a:xfrm>
+            <a:off x="6773697" y="4628367"/>
+            <a:ext cx="1215532" cy="356383"/>
+          </a:xfrm>
+          <a:prstGeom prst="rect">
+            <a:avLst/>
+          </a:prstGeom>
+          <a:ln>
+            <a:noFill/>
+          </a:ln>
+        </p:spPr>
+        <p:style>
+          <a:lnRef idx="2">
+            <a:schemeClr val="accent6"/>
+          </a:lnRef>
+          <a:fillRef idx="1">
+            <a:schemeClr val="lt1"/>
+          </a:fillRef>
+          <a:effectRef idx="0">
+            <a:schemeClr val="accent6"/>
+          </a:effectRef>
+          <a:fontRef idx="minor">
+            <a:schemeClr val="dk1"/>
+          </a:fontRef>
+        </p:style>
+        <p:txBody>
+          <a:bodyPr rtlCol="0" anchor="ctr"/>
+          <a:lstStyle/>
+          <a:p>
+            <a:pPr algn="ctr"/>
+            <a:r>
+              <a:rPr lang="es-ES" sz="1000" dirty="0" err="1">
+                <a:solidFill>
+                  <a:schemeClr val="bg2">
+                    <a:lumMod val="25000"/>
+                  </a:schemeClr>
+                </a:solidFill>
+                <a:latin typeface="Abadi" panose="020B0604020104020204" pitchFamily="34" charset="0"/>
+              </a:rPr>
+              <a:t>Selecting</a:t>
+            </a:r>
+            <a:r>
+              <a:rPr lang="es-ES" sz="1000" dirty="0">
+                <a:solidFill>
+                  <a:schemeClr val="bg2">
+                    <a:lumMod val="25000"/>
+                  </a:schemeClr>
+                </a:solidFill>
+                <a:latin typeface="Abadi" panose="020B0604020104020204" pitchFamily="34" charset="0"/>
+              </a:rPr>
+              <a:t> </a:t>
+            </a:r>
+            <a:r>
+              <a:rPr lang="es-ES" sz="1000" dirty="0" err="1">
+                <a:solidFill>
+                  <a:schemeClr val="bg2">
+                    <a:lumMod val="25000"/>
+                  </a:schemeClr>
+                </a:solidFill>
+                <a:latin typeface="Abadi" panose="020B0604020104020204" pitchFamily="34" charset="0"/>
+              </a:rPr>
+              <a:t>best</a:t>
+            </a:r>
+            <a:r>
+              <a:rPr lang="es-ES" sz="1000" dirty="0">
+                <a:solidFill>
+                  <a:schemeClr val="bg2">
+                    <a:lumMod val="25000"/>
+                  </a:schemeClr>
+                </a:solidFill>
+                <a:latin typeface="Abadi" panose="020B0604020104020204" pitchFamily="34" charset="0"/>
+              </a:rPr>
+              <a:t> </a:t>
+            </a:r>
+            <a:r>
+              <a:rPr lang="es-ES" sz="1000" dirty="0" err="1">
+                <a:solidFill>
+                  <a:schemeClr val="bg2">
+                    <a:lumMod val="25000"/>
+                  </a:schemeClr>
+                </a:solidFill>
+                <a:latin typeface="Abadi" panose="020B0604020104020204" pitchFamily="34" charset="0"/>
+              </a:rPr>
+              <a:t>models</a:t>
+            </a:r>
+            <a:endParaRPr lang="es-CO" sz="1000" dirty="0">
+              <a:solidFill>
+                <a:schemeClr val="bg2">
+                  <a:lumMod val="25000"/>
+                </a:schemeClr>
+              </a:solidFill>
+              <a:latin typeface="Abadi" panose="020B0604020104020204" pitchFamily="34" charset="0"/>
+            </a:endParaRPr>
+          </a:p>
+        </p:txBody>
+      </p:sp>
+      <p:sp>
+        <p:nvSpPr>
+          <p:cNvPr id="21" name="Rectángulo 20">
+            <a:extLst>
+              <a:ext uri="{FF2B5EF4-FFF2-40B4-BE49-F238E27FC236}">
+                <a16:creationId xmlns:a16="http://schemas.microsoft.com/office/drawing/2014/main" id="{E815B68D-E543-44E9-325C-7A5E359AB256}"/>
+              </a:ext>
+            </a:extLst>
+          </p:cNvPr>
+          <p:cNvSpPr/>
+          <p:nvPr/>
+        </p:nvSpPr>
+        <p:spPr>
+          <a:xfrm>
+            <a:off x="5333176" y="4614884"/>
+            <a:ext cx="1317132" cy="356383"/>
+          </a:xfrm>
+          <a:prstGeom prst="rect">
+            <a:avLst/>
+          </a:prstGeom>
+          <a:ln>
+            <a:noFill/>
+          </a:ln>
+        </p:spPr>
+        <p:style>
+          <a:lnRef idx="2">
+            <a:schemeClr val="accent6"/>
+          </a:lnRef>
+          <a:fillRef idx="1">
+            <a:schemeClr val="lt1"/>
+          </a:fillRef>
+          <a:effectRef idx="0">
+            <a:schemeClr val="accent6"/>
+          </a:effectRef>
+          <a:fontRef idx="minor">
+            <a:schemeClr val="dk1"/>
+          </a:fontRef>
+        </p:style>
+        <p:txBody>
+          <a:bodyPr rtlCol="0" anchor="ctr"/>
+          <a:lstStyle/>
+          <a:p>
+            <a:pPr algn="ctr"/>
+            <a:r>
+              <a:rPr lang="es-ES" sz="1000" dirty="0" err="1">
+                <a:solidFill>
+                  <a:schemeClr val="bg2">
+                    <a:lumMod val="25000"/>
+                  </a:schemeClr>
+                </a:solidFill>
+                <a:latin typeface="Abadi" panose="020B0604020104020204" pitchFamily="34" charset="0"/>
+              </a:rPr>
+              <a:t>Adjust</a:t>
+            </a:r>
+            <a:r>
+              <a:rPr lang="es-ES" sz="1000" dirty="0">
+                <a:solidFill>
+                  <a:schemeClr val="bg2">
+                    <a:lumMod val="25000"/>
+                  </a:schemeClr>
+                </a:solidFill>
+                <a:latin typeface="Abadi" panose="020B0604020104020204" pitchFamily="34" charset="0"/>
+              </a:rPr>
+              <a:t> </a:t>
+            </a:r>
+            <a:r>
+              <a:rPr lang="es-ES" sz="1000" dirty="0" err="1">
+                <a:solidFill>
+                  <a:schemeClr val="bg2">
+                    <a:lumMod val="25000"/>
+                  </a:schemeClr>
+                </a:solidFill>
+                <a:latin typeface="Abadi" panose="020B0604020104020204" pitchFamily="34" charset="0"/>
+              </a:rPr>
+              <a:t>hyperpameters</a:t>
+            </a:r>
+            <a:endParaRPr lang="es-CO" sz="1000" dirty="0">
+              <a:solidFill>
+                <a:schemeClr val="bg2">
+                  <a:lumMod val="25000"/>
+                </a:schemeClr>
+              </a:solidFill>
+              <a:latin typeface="Abadi" panose="020B0604020104020204" pitchFamily="34" charset="0"/>
+            </a:endParaRPr>
+          </a:p>
+        </p:txBody>
+      </p:sp>
+      <p:sp>
+        <p:nvSpPr>
+          <p:cNvPr id="22" name="Rectángulo 21">
+            <a:extLst>
+              <a:ext uri="{FF2B5EF4-FFF2-40B4-BE49-F238E27FC236}">
+                <a16:creationId xmlns:a16="http://schemas.microsoft.com/office/drawing/2014/main" id="{B4F2D6DC-82F2-4999-1110-0216B70FCFE2}"/>
+              </a:ext>
+            </a:extLst>
+          </p:cNvPr>
+          <p:cNvSpPr/>
+          <p:nvPr/>
+        </p:nvSpPr>
+        <p:spPr>
+          <a:xfrm>
+            <a:off x="4192911" y="4634716"/>
+            <a:ext cx="805521" cy="356383"/>
+          </a:xfrm>
+          <a:prstGeom prst="rect">
+            <a:avLst/>
+          </a:prstGeom>
+          <a:ln>
+            <a:noFill/>
+          </a:ln>
+        </p:spPr>
+        <p:style>
+          <a:lnRef idx="2">
+            <a:schemeClr val="accent6"/>
+          </a:lnRef>
+          <a:fillRef idx="1">
+            <a:schemeClr val="lt1"/>
+          </a:fillRef>
+          <a:effectRef idx="0">
+            <a:schemeClr val="accent6"/>
+          </a:effectRef>
+          <a:fontRef idx="minor">
+            <a:schemeClr val="dk1"/>
+          </a:fontRef>
+        </p:style>
+        <p:txBody>
+          <a:bodyPr rtlCol="0" anchor="ctr"/>
+          <a:lstStyle/>
+          <a:p>
+            <a:pPr algn="ctr"/>
+            <a:r>
+              <a:rPr lang="es-ES" sz="1000" dirty="0" err="1">
+                <a:solidFill>
+                  <a:schemeClr val="bg2">
+                    <a:lumMod val="25000"/>
+                  </a:schemeClr>
+                </a:solidFill>
+                <a:latin typeface="Abadi" panose="020B0604020104020204" pitchFamily="34" charset="0"/>
+              </a:rPr>
+              <a:t>Splitting</a:t>
+            </a:r>
+            <a:r>
+              <a:rPr lang="es-ES" sz="1000" dirty="0">
+                <a:solidFill>
+                  <a:schemeClr val="bg2">
+                    <a:lumMod val="25000"/>
+                  </a:schemeClr>
+                </a:solidFill>
+                <a:latin typeface="Abadi" panose="020B0604020104020204" pitchFamily="34" charset="0"/>
+              </a:rPr>
+              <a:t> data</a:t>
+            </a:r>
+            <a:endParaRPr lang="es-CO" sz="1000" dirty="0">
+              <a:solidFill>
+                <a:schemeClr val="bg2">
+                  <a:lumMod val="25000"/>
+                </a:schemeClr>
+              </a:solidFill>
+              <a:latin typeface="Abadi" panose="020B0604020104020204" pitchFamily="34" charset="0"/>
+            </a:endParaRPr>
+          </a:p>
+        </p:txBody>
+      </p:sp>
+      <p:sp>
+        <p:nvSpPr>
+          <p:cNvPr id="23" name="Rectángulo 22">
+            <a:extLst>
+              <a:ext uri="{FF2B5EF4-FFF2-40B4-BE49-F238E27FC236}">
+                <a16:creationId xmlns:a16="http://schemas.microsoft.com/office/drawing/2014/main" id="{F81C1CC4-E4D1-E359-8528-651D51F9EF9C}"/>
+              </a:ext>
+            </a:extLst>
+          </p:cNvPr>
+          <p:cNvSpPr/>
+          <p:nvPr/>
+        </p:nvSpPr>
+        <p:spPr>
+          <a:xfrm>
+            <a:off x="2641438" y="4569650"/>
+            <a:ext cx="1317132" cy="356383"/>
+          </a:xfrm>
+          <a:prstGeom prst="rect">
+            <a:avLst/>
+          </a:prstGeom>
+          <a:ln>
+            <a:noFill/>
+          </a:ln>
+        </p:spPr>
+        <p:style>
+          <a:lnRef idx="2">
+            <a:schemeClr val="accent6"/>
+          </a:lnRef>
+          <a:fillRef idx="1">
+            <a:schemeClr val="lt1"/>
+          </a:fillRef>
+          <a:effectRef idx="0">
+            <a:schemeClr val="accent6"/>
+          </a:effectRef>
+          <a:fontRef idx="minor">
+            <a:schemeClr val="dk1"/>
+          </a:fontRef>
+        </p:style>
+        <p:txBody>
+          <a:bodyPr rtlCol="0" anchor="ctr"/>
+          <a:lstStyle/>
+          <a:p>
+            <a:pPr algn="ctr"/>
+            <a:r>
+              <a:rPr lang="es-ES" sz="1000" dirty="0" err="1">
+                <a:solidFill>
+                  <a:schemeClr val="bg2">
+                    <a:lumMod val="25000"/>
+                  </a:schemeClr>
+                </a:solidFill>
+                <a:latin typeface="Abadi" panose="020B0604020104020204" pitchFamily="34" charset="0"/>
+              </a:rPr>
+              <a:t>Choose</a:t>
+            </a:r>
+            <a:r>
+              <a:rPr lang="es-ES" sz="1000" dirty="0">
+                <a:solidFill>
+                  <a:schemeClr val="bg2">
+                    <a:lumMod val="25000"/>
+                  </a:schemeClr>
+                </a:solidFill>
+                <a:latin typeface="Abadi" panose="020B0604020104020204" pitchFamily="34" charset="0"/>
+              </a:rPr>
+              <a:t> </a:t>
+            </a:r>
+            <a:r>
+              <a:rPr lang="es-ES" sz="1000" dirty="0" err="1">
+                <a:solidFill>
+                  <a:schemeClr val="bg2">
+                    <a:lumMod val="25000"/>
+                  </a:schemeClr>
+                </a:solidFill>
+                <a:latin typeface="Abadi" panose="020B0604020104020204" pitchFamily="34" charset="0"/>
+              </a:rPr>
+              <a:t>algorithm</a:t>
+            </a:r>
+            <a:endParaRPr lang="es-CO" sz="1000" dirty="0">
+              <a:solidFill>
+                <a:schemeClr val="bg2">
+                  <a:lumMod val="25000"/>
+                </a:schemeClr>
+              </a:solidFill>
+              <a:latin typeface="Abadi" panose="020B0604020104020204" pitchFamily="34" charset="0"/>
+            </a:endParaRPr>
+          </a:p>
+        </p:txBody>
+      </p:sp>
+      <p:sp>
+        <p:nvSpPr>
+          <p:cNvPr id="24" name="Rectángulo 23">
+            <a:extLst>
+              <a:ext uri="{FF2B5EF4-FFF2-40B4-BE49-F238E27FC236}">
+                <a16:creationId xmlns:a16="http://schemas.microsoft.com/office/drawing/2014/main" id="{C79BAA69-F400-84D2-1765-A94F64557761}"/>
+              </a:ext>
+            </a:extLst>
+          </p:cNvPr>
+          <p:cNvSpPr/>
+          <p:nvPr/>
+        </p:nvSpPr>
+        <p:spPr>
+          <a:xfrm>
+            <a:off x="4027707" y="6260514"/>
+            <a:ext cx="1317132" cy="288574"/>
+          </a:xfrm>
+          <a:prstGeom prst="rect">
+            <a:avLst/>
+          </a:prstGeom>
+          <a:solidFill>
+            <a:srgbClr val="EFF6FF"/>
+          </a:solidFill>
+          <a:ln>
+            <a:noFill/>
+          </a:ln>
+        </p:spPr>
+        <p:style>
+          <a:lnRef idx="2">
+            <a:schemeClr val="accent6"/>
+          </a:lnRef>
+          <a:fillRef idx="1">
+            <a:schemeClr val="lt1"/>
+          </a:fillRef>
+          <a:effectRef idx="0">
+            <a:schemeClr val="accent6"/>
+          </a:effectRef>
+          <a:fontRef idx="minor">
+            <a:schemeClr val="dk1"/>
+          </a:fontRef>
+        </p:style>
+        <p:txBody>
+          <a:bodyPr rtlCol="0" anchor="ctr"/>
+          <a:lstStyle/>
+          <a:p>
+            <a:pPr algn="ctr"/>
+            <a:r>
+              <a:rPr lang="es-ES" sz="900" dirty="0" err="1">
+                <a:solidFill>
+                  <a:schemeClr val="bg2">
+                    <a:lumMod val="25000"/>
+                  </a:schemeClr>
+                </a:solidFill>
+                <a:latin typeface="Abadi" panose="020B0604020104020204" pitchFamily="34" charset="0"/>
+              </a:rPr>
+              <a:t>Binary</a:t>
+            </a:r>
+            <a:r>
+              <a:rPr lang="es-ES" sz="900" dirty="0">
+                <a:solidFill>
+                  <a:schemeClr val="bg2">
+                    <a:lumMod val="25000"/>
+                  </a:schemeClr>
+                </a:solidFill>
+                <a:latin typeface="Abadi" panose="020B0604020104020204" pitchFamily="34" charset="0"/>
+              </a:rPr>
+              <a:t> and continuos </a:t>
+            </a:r>
+            <a:r>
+              <a:rPr lang="es-ES" sz="900" dirty="0" err="1">
+                <a:solidFill>
+                  <a:schemeClr val="bg2">
+                    <a:lumMod val="25000"/>
+                  </a:schemeClr>
+                </a:solidFill>
+                <a:latin typeface="Abadi" panose="020B0604020104020204" pitchFamily="34" charset="0"/>
+              </a:rPr>
+              <a:t>surfaces</a:t>
+            </a:r>
+            <a:endParaRPr lang="es-CO" sz="900" dirty="0">
+              <a:solidFill>
+                <a:schemeClr val="bg2">
+                  <a:lumMod val="25000"/>
+                </a:schemeClr>
+              </a:solidFill>
+              <a:latin typeface="Abadi" panose="020B0604020104020204" pitchFamily="34" charset="0"/>
+            </a:endParaRPr>
+          </a:p>
+        </p:txBody>
+      </p:sp>
+      <p:sp>
+        <p:nvSpPr>
+          <p:cNvPr id="25" name="Rectángulo 24">
+            <a:extLst>
+              <a:ext uri="{FF2B5EF4-FFF2-40B4-BE49-F238E27FC236}">
+                <a16:creationId xmlns:a16="http://schemas.microsoft.com/office/drawing/2014/main" id="{71601B34-1145-7026-6A4B-D3B9E14ECB95}"/>
+              </a:ext>
+            </a:extLst>
+          </p:cNvPr>
+          <p:cNvSpPr/>
+          <p:nvPr/>
+        </p:nvSpPr>
+        <p:spPr>
+          <a:xfrm>
+            <a:off x="5869236" y="6260514"/>
+            <a:ext cx="1164732" cy="288574"/>
+          </a:xfrm>
+          <a:prstGeom prst="rect">
+            <a:avLst/>
+          </a:prstGeom>
+          <a:solidFill>
+            <a:srgbClr val="EFF6FF"/>
+          </a:solidFill>
+          <a:ln>
+            <a:noFill/>
+          </a:ln>
+        </p:spPr>
+        <p:style>
+          <a:lnRef idx="2">
+            <a:schemeClr val="accent6"/>
+          </a:lnRef>
+          <a:fillRef idx="1">
+            <a:schemeClr val="lt1"/>
+          </a:fillRef>
+          <a:effectRef idx="0">
+            <a:schemeClr val="accent6"/>
+          </a:effectRef>
+          <a:fontRef idx="minor">
+            <a:schemeClr val="dk1"/>
+          </a:fontRef>
+        </p:style>
+        <p:txBody>
+          <a:bodyPr rtlCol="0" anchor="ctr"/>
+          <a:lstStyle/>
+          <a:p>
+            <a:pPr algn="ctr"/>
+            <a:r>
+              <a:rPr lang="es-ES" sz="900" dirty="0" err="1">
+                <a:solidFill>
+                  <a:schemeClr val="bg2">
+                    <a:lumMod val="25000"/>
+                  </a:schemeClr>
+                </a:solidFill>
+                <a:latin typeface="Abadi" panose="020B0604020104020204" pitchFamily="34" charset="0"/>
+              </a:rPr>
+              <a:t>Variability</a:t>
+            </a:r>
+            <a:r>
+              <a:rPr lang="es-ES" sz="900" dirty="0">
+                <a:solidFill>
+                  <a:schemeClr val="bg2">
+                    <a:lumMod val="25000"/>
+                  </a:schemeClr>
+                </a:solidFill>
+                <a:latin typeface="Abadi" panose="020B0604020104020204" pitchFamily="34" charset="0"/>
+              </a:rPr>
+              <a:t> </a:t>
+            </a:r>
+            <a:r>
+              <a:rPr lang="es-ES" sz="900" dirty="0" err="1">
+                <a:solidFill>
+                  <a:schemeClr val="bg2">
+                    <a:lumMod val="25000"/>
+                  </a:schemeClr>
+                </a:solidFill>
+                <a:latin typeface="Abadi" panose="020B0604020104020204" pitchFamily="34" charset="0"/>
+              </a:rPr>
+              <a:t>measures</a:t>
+            </a:r>
+            <a:endParaRPr lang="es-CO" sz="900" dirty="0">
+              <a:solidFill>
+                <a:schemeClr val="bg2">
+                  <a:lumMod val="25000"/>
+                </a:schemeClr>
+              </a:solidFill>
+              <a:latin typeface="Abadi" panose="020B0604020104020204" pitchFamily="34" charset="0"/>
+            </a:endParaRPr>
+          </a:p>
+        </p:txBody>
+      </p:sp>
+      <p:sp>
+        <p:nvSpPr>
+          <p:cNvPr id="26" name="Rectángulo 25">
+            <a:extLst>
+              <a:ext uri="{FF2B5EF4-FFF2-40B4-BE49-F238E27FC236}">
+                <a16:creationId xmlns:a16="http://schemas.microsoft.com/office/drawing/2014/main" id="{8D6A0D07-F2A4-F825-DF9C-1D4390E73966}"/>
+              </a:ext>
+            </a:extLst>
+          </p:cNvPr>
+          <p:cNvSpPr/>
+          <p:nvPr/>
+        </p:nvSpPr>
+        <p:spPr>
+          <a:xfrm>
+            <a:off x="7406863" y="6207763"/>
+            <a:ext cx="1164732" cy="288574"/>
+          </a:xfrm>
+          <a:prstGeom prst="rect">
+            <a:avLst/>
+          </a:prstGeom>
+          <a:solidFill>
+            <a:srgbClr val="EFF6FF"/>
+          </a:solidFill>
+          <a:ln>
+            <a:noFill/>
+          </a:ln>
+        </p:spPr>
+        <p:style>
+          <a:lnRef idx="2">
+            <a:schemeClr val="accent6"/>
+          </a:lnRef>
+          <a:fillRef idx="1">
+            <a:schemeClr val="lt1"/>
+          </a:fillRef>
+          <a:effectRef idx="0">
+            <a:schemeClr val="accent6"/>
+          </a:effectRef>
+          <a:fontRef idx="minor">
+            <a:schemeClr val="dk1"/>
+          </a:fontRef>
+        </p:style>
+        <p:txBody>
+          <a:bodyPr rtlCol="0" anchor="ctr"/>
+          <a:lstStyle/>
+          <a:p>
+            <a:pPr algn="ctr"/>
+            <a:r>
+              <a:rPr lang="es-ES" sz="900" dirty="0" err="1">
+                <a:solidFill>
+                  <a:schemeClr val="bg2">
+                    <a:lumMod val="25000"/>
+                  </a:schemeClr>
+                </a:solidFill>
+                <a:latin typeface="Abadi" panose="020B0604020104020204" pitchFamily="34" charset="0"/>
+              </a:rPr>
+              <a:t>Write</a:t>
+            </a:r>
+            <a:r>
+              <a:rPr lang="es-ES" sz="900" dirty="0">
+                <a:solidFill>
+                  <a:schemeClr val="bg2">
+                    <a:lumMod val="25000"/>
+                  </a:schemeClr>
+                </a:solidFill>
+                <a:latin typeface="Abadi" panose="020B0604020104020204" pitchFamily="34" charset="0"/>
+              </a:rPr>
+              <a:t> </a:t>
+            </a:r>
+            <a:r>
+              <a:rPr lang="es-ES" sz="900" dirty="0" err="1">
+                <a:solidFill>
+                  <a:schemeClr val="bg2">
+                    <a:lumMod val="25000"/>
+                  </a:schemeClr>
+                </a:solidFill>
+                <a:latin typeface="Abadi" panose="020B0604020104020204" pitchFamily="34" charset="0"/>
+              </a:rPr>
+              <a:t>rasters</a:t>
+            </a:r>
+            <a:endParaRPr lang="es-CO" sz="900" dirty="0">
+              <a:solidFill>
+                <a:schemeClr val="bg2">
+                  <a:lumMod val="25000"/>
+                </a:schemeClr>
+              </a:solidFill>
+              <a:latin typeface="Abadi" panose="020B0604020104020204" pitchFamily="34" charset="0"/>
+            </a:endParaRPr>
+          </a:p>
+        </p:txBody>
+      </p:sp>
+    </p:spTree>
+    <p:extLst>
+      <p:ext uri="{BB962C8B-B14F-4D97-AF65-F5344CB8AC3E}">
+        <p14:creationId xmlns:p14="http://schemas.microsoft.com/office/powerpoint/2010/main" val="2460059760"/>
+      </p:ext>
+    </p:extLst>
+  </p:cSld>
+  <p:clrMapOvr>
+    <a:masterClrMapping/>
+  </p:clrMapOvr>
+</p:sld>
+</file>
+
 <file path=ppt/theme/theme1.xml><?xml version="1.0" encoding="utf-8"?>
 <a:theme xmlns:a="http://schemas.openxmlformats.org/drawingml/2006/main" name="Tema de Office">
   <a:themeElements>

</xml_diff>

<commit_message>
resolving issues to show flow data chart 2
</commit_message>
<xml_diff>
--- a/modelling/vignettes/folders_file_ppt_diagrama.pptx
+++ b/modelling/vignettes/folders_file_ppt_diagrama.pptx
@@ -10,6 +10,7 @@
     <p:sldId id="259" r:id="rId4"/>
     <p:sldId id="260" r:id="rId5"/>
     <p:sldId id="261" r:id="rId6"/>
+    <p:sldId id="262" r:id="rId7"/>
   </p:sldIdLst>
   <p:sldSz cx="12192000" cy="6858000"/>
   <p:notesSz cx="6858000" cy="9144000"/>
@@ -10717,6 +10718,2015 @@
 </p:sld>
 </file>
 
+<file path=ppt/slides/slide6.xml><?xml version="1.0" encoding="utf-8"?>
+<p:sld xmlns:a="http://schemas.openxmlformats.org/drawingml/2006/main" xmlns:r="http://schemas.openxmlformats.org/officeDocument/2006/relationships" xmlns:p="http://schemas.openxmlformats.org/presentationml/2006/main">
+  <p:cSld>
+    <p:spTree>
+      <p:nvGrpSpPr>
+        <p:cNvPr id="1" name=""/>
+        <p:cNvGrpSpPr/>
+        <p:nvPr/>
+      </p:nvGrpSpPr>
+      <p:grpSpPr>
+        <a:xfrm>
+          <a:off x="0" y="0"/>
+          <a:ext cx="0" cy="0"/>
+          <a:chOff x="0" y="0"/>
+          <a:chExt cx="0" cy="0"/>
+        </a:xfrm>
+      </p:grpSpPr>
+      <p:sp>
+        <p:nvSpPr>
+          <p:cNvPr id="6" name="Título 1">
+            <a:extLst>
+              <a:ext uri="{FF2B5EF4-FFF2-40B4-BE49-F238E27FC236}">
+                <a16:creationId xmlns:a16="http://schemas.microsoft.com/office/drawing/2014/main" id="{AB70A210-23DD-AE89-6BA5-C05F0F4E606D}"/>
+              </a:ext>
+            </a:extLst>
+          </p:cNvPr>
+          <p:cNvSpPr>
+            <a:spLocks noGrp="1"/>
+          </p:cNvSpPr>
+          <p:nvPr>
+            <p:ph type="title"/>
+          </p:nvPr>
+        </p:nvSpPr>
+        <p:spPr>
+          <a:xfrm>
+            <a:off x="838200" y="365125"/>
+            <a:ext cx="10515600" cy="1325563"/>
+          </a:xfrm>
+        </p:spPr>
+        <p:txBody>
+          <a:bodyPr/>
+          <a:lstStyle/>
+          <a:p>
+            <a:endParaRPr lang="es-CO"/>
+          </a:p>
+        </p:txBody>
+      </p:sp>
+      <p:pic>
+        <p:nvPicPr>
+          <p:cNvPr id="7" name="Picture 2">
+            <a:extLst>
+              <a:ext uri="{FF2B5EF4-FFF2-40B4-BE49-F238E27FC236}">
+                <a16:creationId xmlns:a16="http://schemas.microsoft.com/office/drawing/2014/main" id="{716585EA-9109-4DB6-52FA-B91DEF60E0F5}"/>
+              </a:ext>
+            </a:extLst>
+          </p:cNvPr>
+          <p:cNvPicPr>
+            <a:picLocks noChangeAspect="1" noChangeArrowheads="1"/>
+          </p:cNvPicPr>
+          <p:nvPr/>
+        </p:nvPicPr>
+        <p:blipFill>
+          <a:blip r:embed="rId2">
+            <a:extLst>
+              <a:ext uri="{BEBA8EAE-BF5A-486C-A8C5-ECC9F3942E4B}">
+                <a14:imgProps xmlns:a14="http://schemas.microsoft.com/office/drawing/2010/main">
+                  <a14:imgLayer r:embed="rId3">
+                    <a14:imgEffect>
+                      <a14:colorTemperature colorTemp="5900"/>
+                    </a14:imgEffect>
+                    <a14:imgEffect>
+                      <a14:saturation sat="0"/>
+                    </a14:imgEffect>
+                  </a14:imgLayer>
+                </a14:imgProps>
+              </a:ext>
+              <a:ext uri="{28A0092B-C50C-407E-A947-70E740481C1C}">
+                <a14:useLocalDpi xmlns:a14="http://schemas.microsoft.com/office/drawing/2010/main" val="0"/>
+              </a:ext>
+            </a:extLst>
+          </a:blip>
+          <a:srcRect/>
+          <a:stretch>
+            <a:fillRect/>
+          </a:stretch>
+        </p:blipFill>
+        <p:spPr bwMode="auto">
+          <a:xfrm>
+            <a:off x="890588" y="0"/>
+            <a:ext cx="10410825" cy="6858000"/>
+          </a:xfrm>
+          <a:prstGeom prst="rect">
+            <a:avLst/>
+          </a:prstGeom>
+          <a:noFill/>
+          <a:extLst>
+            <a:ext uri="{909E8E84-426E-40DD-AFC4-6F175D3DCCD1}">
+              <a14:hiddenFill xmlns:a14="http://schemas.microsoft.com/office/drawing/2010/main">
+                <a:solidFill>
+                  <a:srgbClr val="FFFFFF"/>
+                </a:solidFill>
+              </a14:hiddenFill>
+            </a:ext>
+          </a:extLst>
+        </p:spPr>
+      </p:pic>
+      <p:sp>
+        <p:nvSpPr>
+          <p:cNvPr id="8" name="Rectángulo 7">
+            <a:extLst>
+              <a:ext uri="{FF2B5EF4-FFF2-40B4-BE49-F238E27FC236}">
+                <a16:creationId xmlns:a16="http://schemas.microsoft.com/office/drawing/2014/main" id="{35FE8E28-1BB2-B429-792F-672F31F93457}"/>
+              </a:ext>
+            </a:extLst>
+          </p:cNvPr>
+          <p:cNvSpPr/>
+          <p:nvPr/>
+        </p:nvSpPr>
+        <p:spPr>
+          <a:xfrm>
+            <a:off x="2813050" y="1167618"/>
+            <a:ext cx="981515" cy="168813"/>
+          </a:xfrm>
+          <a:prstGeom prst="rect">
+            <a:avLst/>
+          </a:prstGeom>
+          <a:ln>
+            <a:noFill/>
+          </a:ln>
+        </p:spPr>
+        <p:style>
+          <a:lnRef idx="2">
+            <a:schemeClr val="accent6"/>
+          </a:lnRef>
+          <a:fillRef idx="1">
+            <a:schemeClr val="lt1"/>
+          </a:fillRef>
+          <a:effectRef idx="0">
+            <a:schemeClr val="accent6"/>
+          </a:effectRef>
+          <a:fontRef idx="minor">
+            <a:schemeClr val="dk1"/>
+          </a:fontRef>
+        </p:style>
+        <p:txBody>
+          <a:bodyPr rtlCol="0" anchor="ctr"/>
+          <a:lstStyle/>
+          <a:p>
+            <a:pPr algn="ctr"/>
+            <a:r>
+              <a:rPr lang="es-ES" sz="1000" dirty="0" err="1">
+                <a:solidFill>
+                  <a:schemeClr val="bg2">
+                    <a:lumMod val="25000"/>
+                  </a:schemeClr>
+                </a:solidFill>
+                <a:latin typeface="Abadi" panose="020B0604020104020204" pitchFamily="34" charset="0"/>
+              </a:rPr>
+              <a:t>Occurrences</a:t>
+            </a:r>
+            <a:endParaRPr lang="es-CO" sz="1000" dirty="0">
+              <a:solidFill>
+                <a:schemeClr val="bg2">
+                  <a:lumMod val="25000"/>
+                </a:schemeClr>
+              </a:solidFill>
+              <a:latin typeface="Abadi" panose="020B0604020104020204" pitchFamily="34" charset="0"/>
+            </a:endParaRPr>
+          </a:p>
+        </p:txBody>
+      </p:sp>
+      <p:sp>
+        <p:nvSpPr>
+          <p:cNvPr id="9" name="Rectángulo 8">
+            <a:extLst>
+              <a:ext uri="{FF2B5EF4-FFF2-40B4-BE49-F238E27FC236}">
+                <a16:creationId xmlns:a16="http://schemas.microsoft.com/office/drawing/2014/main" id="{1DCB27BF-9F27-71B8-695B-C2B56F77D3C8}"/>
+              </a:ext>
+            </a:extLst>
+          </p:cNvPr>
+          <p:cNvSpPr/>
+          <p:nvPr/>
+        </p:nvSpPr>
+        <p:spPr>
+          <a:xfrm>
+            <a:off x="7989229" y="1193018"/>
+            <a:ext cx="1681821" cy="168813"/>
+          </a:xfrm>
+          <a:prstGeom prst="rect">
+            <a:avLst/>
+          </a:prstGeom>
+          <a:ln>
+            <a:noFill/>
+          </a:ln>
+        </p:spPr>
+        <p:style>
+          <a:lnRef idx="2">
+            <a:schemeClr val="accent6"/>
+          </a:lnRef>
+          <a:fillRef idx="1">
+            <a:schemeClr val="lt1"/>
+          </a:fillRef>
+          <a:effectRef idx="0">
+            <a:schemeClr val="accent6"/>
+          </a:effectRef>
+          <a:fontRef idx="minor">
+            <a:schemeClr val="dk1"/>
+          </a:fontRef>
+        </p:style>
+        <p:txBody>
+          <a:bodyPr rtlCol="0" anchor="ctr"/>
+          <a:lstStyle/>
+          <a:p>
+            <a:pPr algn="ctr"/>
+            <a:r>
+              <a:rPr lang="es-ES" sz="1000" dirty="0">
+                <a:solidFill>
+                  <a:schemeClr val="bg2">
+                    <a:lumMod val="25000"/>
+                  </a:schemeClr>
+                </a:solidFill>
+                <a:latin typeface="Abadi" panose="020B0604020104020204" pitchFamily="34" charset="0"/>
+              </a:rPr>
+              <a:t>Explanation variables</a:t>
+            </a:r>
+            <a:endParaRPr lang="es-CO" sz="1000" dirty="0">
+              <a:solidFill>
+                <a:schemeClr val="bg2">
+                  <a:lumMod val="25000"/>
+                </a:schemeClr>
+              </a:solidFill>
+              <a:latin typeface="Abadi" panose="020B0604020104020204" pitchFamily="34" charset="0"/>
+            </a:endParaRPr>
+          </a:p>
+        </p:txBody>
+      </p:sp>
+      <p:sp>
+        <p:nvSpPr>
+          <p:cNvPr id="10" name="Rectángulo 9">
+            <a:extLst>
+              <a:ext uri="{FF2B5EF4-FFF2-40B4-BE49-F238E27FC236}">
+                <a16:creationId xmlns:a16="http://schemas.microsoft.com/office/drawing/2014/main" id="{38DC3912-A690-B5EB-6807-489DDC2EB138}"/>
+              </a:ext>
+            </a:extLst>
+          </p:cNvPr>
+          <p:cNvSpPr/>
+          <p:nvPr/>
+        </p:nvSpPr>
+        <p:spPr>
+          <a:xfrm>
+            <a:off x="10119652" y="676859"/>
+            <a:ext cx="913471" cy="379926"/>
+          </a:xfrm>
+          <a:prstGeom prst="rect">
+            <a:avLst/>
+          </a:prstGeom>
+          <a:solidFill>
+            <a:srgbClr val="E7E4E3"/>
+          </a:solidFill>
+          <a:ln>
+            <a:noFill/>
+          </a:ln>
+        </p:spPr>
+        <p:style>
+          <a:lnRef idx="2">
+            <a:schemeClr val="accent6"/>
+          </a:lnRef>
+          <a:fillRef idx="1">
+            <a:schemeClr val="lt1"/>
+          </a:fillRef>
+          <a:effectRef idx="0">
+            <a:schemeClr val="accent6"/>
+          </a:effectRef>
+          <a:fontRef idx="minor">
+            <a:schemeClr val="dk1"/>
+          </a:fontRef>
+        </p:style>
+        <p:txBody>
+          <a:bodyPr rtlCol="0" anchor="ctr"/>
+          <a:lstStyle/>
+          <a:p>
+            <a:pPr algn="ctr"/>
+            <a:r>
+              <a:rPr lang="es-ES" sz="1200" b="1" dirty="0" err="1">
+                <a:latin typeface="Arial Rounded MT Bold" panose="020F0704030504030204" pitchFamily="34" charset="0"/>
+              </a:rPr>
+              <a:t>Review</a:t>
+            </a:r>
+            <a:endParaRPr lang="es-ES" sz="1200" b="1" dirty="0">
+              <a:latin typeface="Arial Rounded MT Bold" panose="020F0704030504030204" pitchFamily="34" charset="0"/>
+            </a:endParaRPr>
+          </a:p>
+          <a:p>
+            <a:pPr algn="ctr"/>
+            <a:r>
+              <a:rPr lang="es-ES" sz="1200" b="1" dirty="0">
+                <a:latin typeface="Arial Rounded MT Bold" panose="020F0704030504030204" pitchFamily="34" charset="0"/>
+              </a:rPr>
+              <a:t>inputs</a:t>
+            </a:r>
+            <a:endParaRPr lang="es-CO" sz="1200" b="1" dirty="0">
+              <a:latin typeface="Arial Rounded MT Bold" panose="020F0704030504030204" pitchFamily="34" charset="0"/>
+            </a:endParaRPr>
+          </a:p>
+        </p:txBody>
+      </p:sp>
+      <p:sp>
+        <p:nvSpPr>
+          <p:cNvPr id="11" name="Rectángulo 10">
+            <a:extLst>
+              <a:ext uri="{FF2B5EF4-FFF2-40B4-BE49-F238E27FC236}">
+                <a16:creationId xmlns:a16="http://schemas.microsoft.com/office/drawing/2014/main" id="{723EFF73-A5C4-49E3-4223-4CA49DF1E384}"/>
+              </a:ext>
+            </a:extLst>
+          </p:cNvPr>
+          <p:cNvSpPr/>
+          <p:nvPr/>
+        </p:nvSpPr>
+        <p:spPr>
+          <a:xfrm>
+            <a:off x="9994240" y="2350574"/>
+            <a:ext cx="1164297" cy="379926"/>
+          </a:xfrm>
+          <a:prstGeom prst="rect">
+            <a:avLst/>
+          </a:prstGeom>
+          <a:solidFill>
+            <a:srgbClr val="E7E4E3"/>
+          </a:solidFill>
+          <a:ln>
+            <a:noFill/>
+          </a:ln>
+        </p:spPr>
+        <p:style>
+          <a:lnRef idx="2">
+            <a:schemeClr val="accent6"/>
+          </a:lnRef>
+          <a:fillRef idx="1">
+            <a:schemeClr val="lt1"/>
+          </a:fillRef>
+          <a:effectRef idx="0">
+            <a:schemeClr val="accent6"/>
+          </a:effectRef>
+          <a:fontRef idx="minor">
+            <a:schemeClr val="dk1"/>
+          </a:fontRef>
+        </p:style>
+        <p:txBody>
+          <a:bodyPr rtlCol="0" anchor="ctr"/>
+          <a:lstStyle/>
+          <a:p>
+            <a:pPr algn="ctr"/>
+            <a:r>
+              <a:rPr lang="es-ES" sz="1200" b="1" dirty="0">
+                <a:latin typeface="Arial Rounded MT Bold" panose="020F0704030504030204" pitchFamily="34" charset="0"/>
+              </a:rPr>
+              <a:t>Default </a:t>
+            </a:r>
+            <a:r>
+              <a:rPr lang="es-ES" sz="1200" b="1" dirty="0" err="1">
+                <a:latin typeface="Arial Rounded MT Bold" panose="020F0704030504030204" pitchFamily="34" charset="0"/>
+              </a:rPr>
+              <a:t>arguments</a:t>
+            </a:r>
+            <a:endParaRPr lang="es-CO" sz="1200" b="1" dirty="0">
+              <a:latin typeface="Arial Rounded MT Bold" panose="020F0704030504030204" pitchFamily="34" charset="0"/>
+            </a:endParaRPr>
+          </a:p>
+        </p:txBody>
+      </p:sp>
+      <p:sp>
+        <p:nvSpPr>
+          <p:cNvPr id="12" name="Rectángulo 11">
+            <a:extLst>
+              <a:ext uri="{FF2B5EF4-FFF2-40B4-BE49-F238E27FC236}">
+                <a16:creationId xmlns:a16="http://schemas.microsoft.com/office/drawing/2014/main" id="{82A1F353-583B-5227-BEF3-184ADC4AEE45}"/>
+              </a:ext>
+            </a:extLst>
+          </p:cNvPr>
+          <p:cNvSpPr/>
+          <p:nvPr/>
+        </p:nvSpPr>
+        <p:spPr>
+          <a:xfrm>
+            <a:off x="9925979" y="3685148"/>
+            <a:ext cx="1300821" cy="379926"/>
+          </a:xfrm>
+          <a:prstGeom prst="rect">
+            <a:avLst/>
+          </a:prstGeom>
+          <a:solidFill>
+            <a:srgbClr val="E7E4E3"/>
+          </a:solidFill>
+          <a:ln>
+            <a:noFill/>
+          </a:ln>
+        </p:spPr>
+        <p:style>
+          <a:lnRef idx="2">
+            <a:schemeClr val="accent6"/>
+          </a:lnRef>
+          <a:fillRef idx="1">
+            <a:schemeClr val="lt1"/>
+          </a:fillRef>
+          <a:effectRef idx="0">
+            <a:schemeClr val="accent6"/>
+          </a:effectRef>
+          <a:fontRef idx="minor">
+            <a:schemeClr val="dk1"/>
+          </a:fontRef>
+        </p:style>
+        <p:txBody>
+          <a:bodyPr rtlCol="0" anchor="ctr"/>
+          <a:lstStyle/>
+          <a:p>
+            <a:pPr algn="ctr"/>
+            <a:r>
+              <a:rPr lang="es-ES" sz="1200" b="1" dirty="0">
+                <a:latin typeface="Arial Rounded MT Bold" panose="020F0704030504030204" pitchFamily="34" charset="0"/>
+                <a:ea typeface="ADLaM Display" panose="020F0502020204030204" pitchFamily="2" charset="0"/>
+                <a:cs typeface="ADLaM Display" panose="020F0502020204030204" pitchFamily="2" charset="0"/>
+              </a:rPr>
+              <a:t>Files and </a:t>
+            </a:r>
+            <a:r>
+              <a:rPr lang="es-ES" sz="1200" b="1" dirty="0" err="1">
+                <a:latin typeface="Arial Rounded MT Bold" panose="020F0704030504030204" pitchFamily="34" charset="0"/>
+                <a:ea typeface="ADLaM Display" panose="020F0502020204030204" pitchFamily="2" charset="0"/>
+                <a:cs typeface="ADLaM Display" panose="020F0502020204030204" pitchFamily="2" charset="0"/>
+              </a:rPr>
+              <a:t>Logfile</a:t>
+            </a:r>
+            <a:r>
+              <a:rPr lang="es-ES" sz="1200" b="1" dirty="0">
+                <a:latin typeface="Arial Rounded MT Bold" panose="020F0704030504030204" pitchFamily="34" charset="0"/>
+                <a:ea typeface="ADLaM Display" panose="020F0502020204030204" pitchFamily="2" charset="0"/>
+                <a:cs typeface="ADLaM Display" panose="020F0502020204030204" pitchFamily="2" charset="0"/>
+              </a:rPr>
+              <a:t> </a:t>
+            </a:r>
+            <a:r>
+              <a:rPr lang="es-ES" sz="1200" b="1" dirty="0" err="1">
+                <a:latin typeface="Arial Rounded MT Bold" panose="020F0704030504030204" pitchFamily="34" charset="0"/>
+                <a:ea typeface="ADLaM Display" panose="020F0502020204030204" pitchFamily="2" charset="0"/>
+                <a:cs typeface="ADLaM Display" panose="020F0502020204030204" pitchFamily="2" charset="0"/>
+              </a:rPr>
+              <a:t>setup</a:t>
+            </a:r>
+            <a:endParaRPr lang="es-CO" sz="1200" b="1" dirty="0">
+              <a:latin typeface="Arial Rounded MT Bold" panose="020F0704030504030204" pitchFamily="34" charset="0"/>
+              <a:ea typeface="ADLaM Display" panose="020F0502020204030204" pitchFamily="2" charset="0"/>
+              <a:cs typeface="ADLaM Display" panose="020F0502020204030204" pitchFamily="2" charset="0"/>
+            </a:endParaRPr>
+          </a:p>
+        </p:txBody>
+      </p:sp>
+      <p:sp>
+        <p:nvSpPr>
+          <p:cNvPr id="13" name="Rectángulo 12">
+            <a:extLst>
+              <a:ext uri="{FF2B5EF4-FFF2-40B4-BE49-F238E27FC236}">
+                <a16:creationId xmlns:a16="http://schemas.microsoft.com/office/drawing/2014/main" id="{2BA3CDC7-3A44-9A83-52F7-F8F9E4B1B3BD}"/>
+              </a:ext>
+            </a:extLst>
+          </p:cNvPr>
+          <p:cNvSpPr/>
+          <p:nvPr/>
+        </p:nvSpPr>
+        <p:spPr>
+          <a:xfrm>
+            <a:off x="9964870" y="5454650"/>
+            <a:ext cx="1223033" cy="255074"/>
+          </a:xfrm>
+          <a:prstGeom prst="rect">
+            <a:avLst/>
+          </a:prstGeom>
+          <a:solidFill>
+            <a:srgbClr val="E7E4E3"/>
+          </a:solidFill>
+          <a:ln>
+            <a:noFill/>
+          </a:ln>
+        </p:spPr>
+        <p:style>
+          <a:lnRef idx="2">
+            <a:schemeClr val="accent6"/>
+          </a:lnRef>
+          <a:fillRef idx="1">
+            <a:schemeClr val="lt1"/>
+          </a:fillRef>
+          <a:effectRef idx="0">
+            <a:schemeClr val="accent6"/>
+          </a:effectRef>
+          <a:fontRef idx="minor">
+            <a:schemeClr val="dk1"/>
+          </a:fontRef>
+        </p:style>
+        <p:txBody>
+          <a:bodyPr rtlCol="0" anchor="ctr"/>
+          <a:lstStyle/>
+          <a:p>
+            <a:pPr algn="ctr"/>
+            <a:r>
+              <a:rPr lang="es-ES" sz="1200" b="1" dirty="0" err="1">
+                <a:latin typeface="Arial Rounded MT Bold" panose="020F0704030504030204" pitchFamily="34" charset="0"/>
+                <a:ea typeface="ADLaM Display" panose="020F0502020204030204" pitchFamily="2" charset="0"/>
+                <a:cs typeface="ADLaM Display" panose="020F0502020204030204" pitchFamily="2" charset="0"/>
+              </a:rPr>
+              <a:t>Cleaning</a:t>
+            </a:r>
+            <a:r>
+              <a:rPr lang="es-ES" sz="1200" b="1" dirty="0">
+                <a:latin typeface="Arial Rounded MT Bold" panose="020F0704030504030204" pitchFamily="34" charset="0"/>
+                <a:ea typeface="ADLaM Display" panose="020F0502020204030204" pitchFamily="2" charset="0"/>
+                <a:cs typeface="ADLaM Display" panose="020F0502020204030204" pitchFamily="2" charset="0"/>
+              </a:rPr>
+              <a:t> files</a:t>
+            </a:r>
+            <a:endParaRPr lang="es-CO" sz="1200" b="1" dirty="0">
+              <a:latin typeface="Arial Rounded MT Bold" panose="020F0704030504030204" pitchFamily="34" charset="0"/>
+              <a:ea typeface="ADLaM Display" panose="020F0502020204030204" pitchFamily="2" charset="0"/>
+              <a:cs typeface="ADLaM Display" panose="020F0502020204030204" pitchFamily="2" charset="0"/>
+            </a:endParaRPr>
+          </a:p>
+        </p:txBody>
+      </p:sp>
+      <p:sp>
+        <p:nvSpPr>
+          <p:cNvPr id="14" name="Rectángulo 13">
+            <a:extLst>
+              <a:ext uri="{FF2B5EF4-FFF2-40B4-BE49-F238E27FC236}">
+                <a16:creationId xmlns:a16="http://schemas.microsoft.com/office/drawing/2014/main" id="{65604261-577F-5944-277A-CB00B1037F84}"/>
+              </a:ext>
+            </a:extLst>
+          </p:cNvPr>
+          <p:cNvSpPr/>
+          <p:nvPr/>
+        </p:nvSpPr>
+        <p:spPr>
+          <a:xfrm>
+            <a:off x="985970" y="5881174"/>
+            <a:ext cx="1223033" cy="255074"/>
+          </a:xfrm>
+          <a:prstGeom prst="rect">
+            <a:avLst/>
+          </a:prstGeom>
+          <a:solidFill>
+            <a:schemeClr val="bg1"/>
+          </a:solidFill>
+          <a:ln>
+            <a:noFill/>
+          </a:ln>
+        </p:spPr>
+        <p:style>
+          <a:lnRef idx="2">
+            <a:schemeClr val="accent6"/>
+          </a:lnRef>
+          <a:fillRef idx="1">
+            <a:schemeClr val="lt1"/>
+          </a:fillRef>
+          <a:effectRef idx="0">
+            <a:schemeClr val="accent6"/>
+          </a:effectRef>
+          <a:fontRef idx="minor">
+            <a:schemeClr val="dk1"/>
+          </a:fontRef>
+        </p:style>
+        <p:txBody>
+          <a:bodyPr rtlCol="0" anchor="ctr"/>
+          <a:lstStyle/>
+          <a:p>
+            <a:pPr algn="ctr"/>
+            <a:r>
+              <a:rPr lang="es-ES" sz="1100" b="1" dirty="0">
+                <a:latin typeface="Arial Rounded MT Bold" panose="020F0704030504030204" pitchFamily="34" charset="0"/>
+                <a:ea typeface="ADLaM Display" panose="020F0502020204030204" pitchFamily="2" charset="0"/>
+                <a:cs typeface="Arial" panose="020B0604020202020204" pitchFamily="34" charset="0"/>
+              </a:rPr>
+              <a:t>Ensemble</a:t>
+            </a:r>
+            <a:endParaRPr lang="es-CO" sz="1100" b="1" dirty="0">
+              <a:latin typeface="Arial Rounded MT Bold" panose="020F0704030504030204" pitchFamily="34" charset="0"/>
+              <a:ea typeface="ADLaM Display" panose="020F0502020204030204" pitchFamily="2" charset="0"/>
+              <a:cs typeface="Arial" panose="020B0604020202020204" pitchFamily="34" charset="0"/>
+            </a:endParaRPr>
+          </a:p>
+        </p:txBody>
+      </p:sp>
+      <p:sp>
+        <p:nvSpPr>
+          <p:cNvPr id="15" name="Rectángulo 14">
+            <a:extLst>
+              <a:ext uri="{FF2B5EF4-FFF2-40B4-BE49-F238E27FC236}">
+                <a16:creationId xmlns:a16="http://schemas.microsoft.com/office/drawing/2014/main" id="{FF758535-6C8D-80E2-662F-04C074CD2560}"/>
+              </a:ext>
+            </a:extLst>
+          </p:cNvPr>
+          <p:cNvSpPr/>
+          <p:nvPr/>
+        </p:nvSpPr>
+        <p:spPr>
+          <a:xfrm>
+            <a:off x="985970" y="4065074"/>
+            <a:ext cx="1223033" cy="379926"/>
+          </a:xfrm>
+          <a:prstGeom prst="rect">
+            <a:avLst/>
+          </a:prstGeom>
+          <a:solidFill>
+            <a:srgbClr val="888888"/>
+          </a:solidFill>
+          <a:ln>
+            <a:noFill/>
+          </a:ln>
+        </p:spPr>
+        <p:style>
+          <a:lnRef idx="2">
+            <a:schemeClr val="accent6"/>
+          </a:lnRef>
+          <a:fillRef idx="1">
+            <a:schemeClr val="lt1"/>
+          </a:fillRef>
+          <a:effectRef idx="0">
+            <a:schemeClr val="accent6"/>
+          </a:effectRef>
+          <a:fontRef idx="minor">
+            <a:schemeClr val="dk1"/>
+          </a:fontRef>
+        </p:style>
+        <p:txBody>
+          <a:bodyPr rtlCol="0" anchor="ctr"/>
+          <a:lstStyle/>
+          <a:p>
+            <a:pPr algn="ctr"/>
+            <a:r>
+              <a:rPr lang="es-ES" sz="1100" b="1" dirty="0">
+                <a:solidFill>
+                  <a:schemeClr val="bg1"/>
+                </a:solidFill>
+                <a:latin typeface="Arial Rounded MT Bold" panose="020F0704030504030204" pitchFamily="34" charset="0"/>
+                <a:ea typeface="ADLaM Display" panose="020F0502020204030204" pitchFamily="2" charset="0"/>
+                <a:cs typeface="Arial" panose="020B0604020202020204" pitchFamily="34" charset="0"/>
+              </a:rPr>
+              <a:t>Training and </a:t>
+            </a:r>
+            <a:r>
+              <a:rPr lang="es-ES" sz="1100" b="1" dirty="0" err="1">
+                <a:solidFill>
+                  <a:schemeClr val="bg1"/>
+                </a:solidFill>
+                <a:latin typeface="Arial Rounded MT Bold" panose="020F0704030504030204" pitchFamily="34" charset="0"/>
+                <a:ea typeface="ADLaM Display" panose="020F0502020204030204" pitchFamily="2" charset="0"/>
+                <a:cs typeface="Arial" panose="020B0604020202020204" pitchFamily="34" charset="0"/>
+              </a:rPr>
+              <a:t>evaluation</a:t>
+            </a:r>
+            <a:endParaRPr lang="es-CO" sz="1100" b="1" dirty="0">
+              <a:solidFill>
+                <a:schemeClr val="bg1"/>
+              </a:solidFill>
+              <a:latin typeface="Arial Rounded MT Bold" panose="020F0704030504030204" pitchFamily="34" charset="0"/>
+              <a:ea typeface="ADLaM Display" panose="020F0502020204030204" pitchFamily="2" charset="0"/>
+              <a:cs typeface="Arial" panose="020B0604020202020204" pitchFamily="34" charset="0"/>
+            </a:endParaRPr>
+          </a:p>
+        </p:txBody>
+      </p:sp>
+      <p:sp>
+        <p:nvSpPr>
+          <p:cNvPr id="16" name="Rectángulo 15">
+            <a:extLst>
+              <a:ext uri="{FF2B5EF4-FFF2-40B4-BE49-F238E27FC236}">
+                <a16:creationId xmlns:a16="http://schemas.microsoft.com/office/drawing/2014/main" id="{861AD097-DC3C-EED3-1B79-DB1B3E84FBFD}"/>
+              </a:ext>
+            </a:extLst>
+          </p:cNvPr>
+          <p:cNvSpPr/>
+          <p:nvPr/>
+        </p:nvSpPr>
+        <p:spPr>
+          <a:xfrm>
+            <a:off x="985969" y="2456376"/>
+            <a:ext cx="1223033" cy="255074"/>
+          </a:xfrm>
+          <a:prstGeom prst="rect">
+            <a:avLst/>
+          </a:prstGeom>
+          <a:solidFill>
+            <a:schemeClr val="bg1"/>
+          </a:solidFill>
+          <a:ln>
+            <a:noFill/>
+          </a:ln>
+        </p:spPr>
+        <p:style>
+          <a:lnRef idx="2">
+            <a:schemeClr val="accent6"/>
+          </a:lnRef>
+          <a:fillRef idx="1">
+            <a:schemeClr val="lt1"/>
+          </a:fillRef>
+          <a:effectRef idx="0">
+            <a:schemeClr val="accent6"/>
+          </a:effectRef>
+          <a:fontRef idx="minor">
+            <a:schemeClr val="dk1"/>
+          </a:fontRef>
+        </p:style>
+        <p:txBody>
+          <a:bodyPr rtlCol="0" anchor="ctr"/>
+          <a:lstStyle/>
+          <a:p>
+            <a:pPr algn="ctr"/>
+            <a:r>
+              <a:rPr lang="es-ES" sz="1100" b="1" dirty="0">
+                <a:latin typeface="Arial Rounded MT Bold" panose="020F0704030504030204" pitchFamily="34" charset="0"/>
+                <a:ea typeface="ADLaM Display" panose="020F0502020204030204" pitchFamily="2" charset="0"/>
+                <a:cs typeface="Arial" panose="020B0604020202020204" pitchFamily="34" charset="0"/>
+              </a:rPr>
+              <a:t>Processing</a:t>
+            </a:r>
+            <a:endParaRPr lang="es-CO" sz="1100" b="1" dirty="0">
+              <a:latin typeface="Arial Rounded MT Bold" panose="020F0704030504030204" pitchFamily="34" charset="0"/>
+              <a:ea typeface="ADLaM Display" panose="020F0502020204030204" pitchFamily="2" charset="0"/>
+              <a:cs typeface="Arial" panose="020B0604020202020204" pitchFamily="34" charset="0"/>
+            </a:endParaRPr>
+          </a:p>
+        </p:txBody>
+      </p:sp>
+      <p:sp>
+        <p:nvSpPr>
+          <p:cNvPr id="17" name="Rectángulo 16">
+            <a:extLst>
+              <a:ext uri="{FF2B5EF4-FFF2-40B4-BE49-F238E27FC236}">
+                <a16:creationId xmlns:a16="http://schemas.microsoft.com/office/drawing/2014/main" id="{F751C423-A745-D0E0-80D7-5CA8BB1D3340}"/>
+              </a:ext>
+            </a:extLst>
+          </p:cNvPr>
+          <p:cNvSpPr/>
+          <p:nvPr/>
+        </p:nvSpPr>
+        <p:spPr>
+          <a:xfrm>
+            <a:off x="2425700" y="2786868"/>
+            <a:ext cx="981515" cy="168813"/>
+          </a:xfrm>
+          <a:prstGeom prst="rect">
+            <a:avLst/>
+          </a:prstGeom>
+          <a:solidFill>
+            <a:srgbClr val="E8E8E8"/>
+          </a:solidFill>
+          <a:ln>
+            <a:noFill/>
+          </a:ln>
+        </p:spPr>
+        <p:style>
+          <a:lnRef idx="2">
+            <a:schemeClr val="accent6"/>
+          </a:lnRef>
+          <a:fillRef idx="1">
+            <a:schemeClr val="lt1"/>
+          </a:fillRef>
+          <a:effectRef idx="0">
+            <a:schemeClr val="accent6"/>
+          </a:effectRef>
+          <a:fontRef idx="minor">
+            <a:schemeClr val="dk1"/>
+          </a:fontRef>
+        </p:style>
+        <p:txBody>
+          <a:bodyPr rtlCol="0" anchor="ctr"/>
+          <a:lstStyle/>
+          <a:p>
+            <a:pPr algn="ctr"/>
+            <a:r>
+              <a:rPr lang="es-ES" sz="1000" dirty="0" err="1">
+                <a:solidFill>
+                  <a:schemeClr val="bg2">
+                    <a:lumMod val="10000"/>
+                  </a:schemeClr>
+                </a:solidFill>
+                <a:latin typeface="Abadi" panose="020B0604020104020204" pitchFamily="34" charset="0"/>
+              </a:rPr>
+              <a:t>Formatting</a:t>
+            </a:r>
+            <a:endParaRPr lang="es-CO" sz="1000" dirty="0">
+              <a:solidFill>
+                <a:schemeClr val="bg2">
+                  <a:lumMod val="10000"/>
+                </a:schemeClr>
+              </a:solidFill>
+              <a:latin typeface="Abadi" panose="020B0604020104020204" pitchFamily="34" charset="0"/>
+            </a:endParaRPr>
+          </a:p>
+        </p:txBody>
+      </p:sp>
+      <p:sp>
+        <p:nvSpPr>
+          <p:cNvPr id="18" name="Rectángulo 17">
+            <a:extLst>
+              <a:ext uri="{FF2B5EF4-FFF2-40B4-BE49-F238E27FC236}">
+                <a16:creationId xmlns:a16="http://schemas.microsoft.com/office/drawing/2014/main" id="{002DE99E-1A08-06B0-40E9-99CCBABF4C2E}"/>
+              </a:ext>
+            </a:extLst>
+          </p:cNvPr>
+          <p:cNvSpPr/>
+          <p:nvPr/>
+        </p:nvSpPr>
+        <p:spPr>
+          <a:xfrm>
+            <a:off x="3508811" y="2795074"/>
+            <a:ext cx="981515" cy="329126"/>
+          </a:xfrm>
+          <a:prstGeom prst="rect">
+            <a:avLst/>
+          </a:prstGeom>
+          <a:solidFill>
+            <a:srgbClr val="E8E8E8"/>
+          </a:solidFill>
+          <a:ln>
+            <a:noFill/>
+          </a:ln>
+        </p:spPr>
+        <p:style>
+          <a:lnRef idx="2">
+            <a:schemeClr val="accent6"/>
+          </a:lnRef>
+          <a:fillRef idx="1">
+            <a:schemeClr val="lt1"/>
+          </a:fillRef>
+          <a:effectRef idx="0">
+            <a:schemeClr val="accent6"/>
+          </a:effectRef>
+          <a:fontRef idx="minor">
+            <a:schemeClr val="dk1"/>
+          </a:fontRef>
+        </p:style>
+        <p:txBody>
+          <a:bodyPr rtlCol="0" anchor="ctr"/>
+          <a:lstStyle/>
+          <a:p>
+            <a:pPr algn="ctr"/>
+            <a:r>
+              <a:rPr lang="es-ES" sz="1000" dirty="0" err="1">
+                <a:solidFill>
+                  <a:schemeClr val="bg2">
+                    <a:lumMod val="10000"/>
+                  </a:schemeClr>
+                </a:solidFill>
+                <a:latin typeface="Abadi" panose="020B0604020104020204" pitchFamily="34" charset="0"/>
+              </a:rPr>
+              <a:t>Duplicate</a:t>
+            </a:r>
+            <a:endParaRPr lang="es-ES" sz="1000" dirty="0">
+              <a:solidFill>
+                <a:schemeClr val="bg2">
+                  <a:lumMod val="10000"/>
+                </a:schemeClr>
+              </a:solidFill>
+              <a:latin typeface="Abadi" panose="020B0604020104020204" pitchFamily="34" charset="0"/>
+            </a:endParaRPr>
+          </a:p>
+          <a:p>
+            <a:pPr algn="ctr"/>
+            <a:r>
+              <a:rPr lang="es-ES" sz="1000" dirty="0" err="1">
+                <a:solidFill>
+                  <a:schemeClr val="bg2">
+                    <a:lumMod val="10000"/>
+                  </a:schemeClr>
+                </a:solidFill>
+                <a:latin typeface="Abadi" panose="020B0604020104020204" pitchFamily="34" charset="0"/>
+              </a:rPr>
+              <a:t>remotion</a:t>
+            </a:r>
+            <a:endParaRPr lang="es-CO" sz="1000" dirty="0">
+              <a:solidFill>
+                <a:schemeClr val="bg2">
+                  <a:lumMod val="10000"/>
+                </a:schemeClr>
+              </a:solidFill>
+              <a:latin typeface="Abadi" panose="020B0604020104020204" pitchFamily="34" charset="0"/>
+            </a:endParaRPr>
+          </a:p>
+        </p:txBody>
+      </p:sp>
+      <p:sp>
+        <p:nvSpPr>
+          <p:cNvPr id="19" name="Rectángulo 18">
+            <a:extLst>
+              <a:ext uri="{FF2B5EF4-FFF2-40B4-BE49-F238E27FC236}">
+                <a16:creationId xmlns:a16="http://schemas.microsoft.com/office/drawing/2014/main" id="{71D1E67E-477E-4CC9-BBB7-796CEBC342C7}"/>
+              </a:ext>
+            </a:extLst>
+          </p:cNvPr>
+          <p:cNvSpPr/>
+          <p:nvPr/>
+        </p:nvSpPr>
+        <p:spPr>
+          <a:xfrm>
+            <a:off x="4620061" y="2857256"/>
+            <a:ext cx="1136650" cy="196850"/>
+          </a:xfrm>
+          <a:prstGeom prst="rect">
+            <a:avLst/>
+          </a:prstGeom>
+          <a:solidFill>
+            <a:srgbClr val="E8E8E8"/>
+          </a:solidFill>
+          <a:ln>
+            <a:noFill/>
+          </a:ln>
+        </p:spPr>
+        <p:style>
+          <a:lnRef idx="2">
+            <a:schemeClr val="accent6"/>
+          </a:lnRef>
+          <a:fillRef idx="1">
+            <a:schemeClr val="lt1"/>
+          </a:fillRef>
+          <a:effectRef idx="0">
+            <a:schemeClr val="accent6"/>
+          </a:effectRef>
+          <a:fontRef idx="minor">
+            <a:schemeClr val="dk1"/>
+          </a:fontRef>
+        </p:style>
+        <p:txBody>
+          <a:bodyPr rtlCol="0" anchor="ctr"/>
+          <a:lstStyle/>
+          <a:p>
+            <a:pPr algn="ctr"/>
+            <a:r>
+              <a:rPr lang="es-ES" sz="1000" dirty="0" err="1">
+                <a:solidFill>
+                  <a:schemeClr val="bg2">
+                    <a:lumMod val="10000"/>
+                  </a:schemeClr>
+                </a:solidFill>
+                <a:latin typeface="Abadi" panose="020B0604020104020204" pitchFamily="34" charset="0"/>
+              </a:rPr>
+              <a:t>Bias</a:t>
+            </a:r>
+            <a:r>
+              <a:rPr lang="es-ES" sz="1000" dirty="0">
+                <a:solidFill>
+                  <a:schemeClr val="bg2">
+                    <a:lumMod val="10000"/>
+                  </a:schemeClr>
+                </a:solidFill>
+                <a:latin typeface="Abadi" panose="020B0604020104020204" pitchFamily="34" charset="0"/>
+              </a:rPr>
+              <a:t> </a:t>
+            </a:r>
+            <a:r>
+              <a:rPr lang="es-ES" sz="1000" dirty="0" err="1">
+                <a:solidFill>
+                  <a:schemeClr val="bg2">
+                    <a:lumMod val="10000"/>
+                  </a:schemeClr>
+                </a:solidFill>
+                <a:latin typeface="Abadi" panose="020B0604020104020204" pitchFamily="34" charset="0"/>
+              </a:rPr>
+              <a:t>management</a:t>
+            </a:r>
+            <a:endParaRPr lang="es-CO" sz="1000" dirty="0">
+              <a:solidFill>
+                <a:schemeClr val="bg2">
+                  <a:lumMod val="10000"/>
+                </a:schemeClr>
+              </a:solidFill>
+              <a:latin typeface="Abadi" panose="020B0604020104020204" pitchFamily="34" charset="0"/>
+            </a:endParaRPr>
+          </a:p>
+        </p:txBody>
+      </p:sp>
+      <p:sp>
+        <p:nvSpPr>
+          <p:cNvPr id="20" name="Rectángulo 19">
+            <a:extLst>
+              <a:ext uri="{FF2B5EF4-FFF2-40B4-BE49-F238E27FC236}">
+                <a16:creationId xmlns:a16="http://schemas.microsoft.com/office/drawing/2014/main" id="{20AD639C-64F8-2CB2-85AD-5365B744FFA3}"/>
+              </a:ext>
+            </a:extLst>
+          </p:cNvPr>
+          <p:cNvSpPr/>
+          <p:nvPr/>
+        </p:nvSpPr>
+        <p:spPr>
+          <a:xfrm>
+            <a:off x="5855138" y="2852224"/>
+            <a:ext cx="1136650" cy="329126"/>
+          </a:xfrm>
+          <a:prstGeom prst="rect">
+            <a:avLst/>
+          </a:prstGeom>
+          <a:solidFill>
+            <a:srgbClr val="E8E8E8"/>
+          </a:solidFill>
+          <a:ln>
+            <a:noFill/>
+          </a:ln>
+        </p:spPr>
+        <p:style>
+          <a:lnRef idx="2">
+            <a:schemeClr val="accent6"/>
+          </a:lnRef>
+          <a:fillRef idx="1">
+            <a:schemeClr val="lt1"/>
+          </a:fillRef>
+          <a:effectRef idx="0">
+            <a:schemeClr val="accent6"/>
+          </a:effectRef>
+          <a:fontRef idx="minor">
+            <a:schemeClr val="dk1"/>
+          </a:fontRef>
+        </p:style>
+        <p:txBody>
+          <a:bodyPr rtlCol="0" anchor="ctr"/>
+          <a:lstStyle/>
+          <a:p>
+            <a:pPr algn="ctr"/>
+            <a:r>
+              <a:rPr lang="es-ES" sz="1000" dirty="0" err="1">
+                <a:solidFill>
+                  <a:schemeClr val="bg2">
+                    <a:lumMod val="10000"/>
+                  </a:schemeClr>
+                </a:solidFill>
+                <a:latin typeface="Abadi" panose="020B0604020104020204" pitchFamily="34" charset="0"/>
+              </a:rPr>
+              <a:t>Area</a:t>
+            </a:r>
+            <a:r>
+              <a:rPr lang="es-ES" sz="1000" dirty="0">
+                <a:solidFill>
+                  <a:schemeClr val="bg2">
+                    <a:lumMod val="10000"/>
+                  </a:schemeClr>
+                </a:solidFill>
+                <a:latin typeface="Abadi" panose="020B0604020104020204" pitchFamily="34" charset="0"/>
+              </a:rPr>
+              <a:t> </a:t>
+            </a:r>
+            <a:r>
+              <a:rPr lang="es-ES" sz="1000" dirty="0" err="1">
+                <a:solidFill>
+                  <a:schemeClr val="bg2">
+                    <a:lumMod val="10000"/>
+                  </a:schemeClr>
+                </a:solidFill>
+                <a:latin typeface="Abadi" panose="020B0604020104020204" pitchFamily="34" charset="0"/>
+              </a:rPr>
+              <a:t>of</a:t>
+            </a:r>
+            <a:r>
+              <a:rPr lang="es-ES" sz="1000" dirty="0">
+                <a:solidFill>
+                  <a:schemeClr val="bg2">
+                    <a:lumMod val="10000"/>
+                  </a:schemeClr>
+                </a:solidFill>
+                <a:latin typeface="Abadi" panose="020B0604020104020204" pitchFamily="34" charset="0"/>
+              </a:rPr>
+              <a:t> </a:t>
+            </a:r>
+            <a:r>
+              <a:rPr lang="es-ES" sz="1000" dirty="0" err="1">
+                <a:solidFill>
+                  <a:schemeClr val="bg2">
+                    <a:lumMod val="10000"/>
+                  </a:schemeClr>
+                </a:solidFill>
+                <a:latin typeface="Abadi" panose="020B0604020104020204" pitchFamily="34" charset="0"/>
+              </a:rPr>
+              <a:t>interest</a:t>
+            </a:r>
+            <a:r>
+              <a:rPr lang="es-ES" sz="1000" dirty="0">
+                <a:solidFill>
+                  <a:schemeClr val="bg2">
+                    <a:lumMod val="10000"/>
+                  </a:schemeClr>
+                </a:solidFill>
+                <a:latin typeface="Abadi" panose="020B0604020104020204" pitchFamily="34" charset="0"/>
+              </a:rPr>
+              <a:t> </a:t>
+            </a:r>
+            <a:r>
+              <a:rPr lang="es-ES" sz="1000" dirty="0" err="1">
+                <a:solidFill>
+                  <a:schemeClr val="bg2">
+                    <a:lumMod val="10000"/>
+                  </a:schemeClr>
+                </a:solidFill>
+                <a:latin typeface="Abadi" panose="020B0604020104020204" pitchFamily="34" charset="0"/>
+              </a:rPr>
+              <a:t>creation</a:t>
+            </a:r>
+            <a:endParaRPr lang="es-CO" sz="1000" dirty="0">
+              <a:solidFill>
+                <a:schemeClr val="bg2">
+                  <a:lumMod val="10000"/>
+                </a:schemeClr>
+              </a:solidFill>
+              <a:latin typeface="Abadi" panose="020B0604020104020204" pitchFamily="34" charset="0"/>
+            </a:endParaRPr>
+          </a:p>
+        </p:txBody>
+      </p:sp>
+      <p:sp>
+        <p:nvSpPr>
+          <p:cNvPr id="21" name="Rectángulo 20">
+            <a:extLst>
+              <a:ext uri="{FF2B5EF4-FFF2-40B4-BE49-F238E27FC236}">
+                <a16:creationId xmlns:a16="http://schemas.microsoft.com/office/drawing/2014/main" id="{6EA4D967-3BE5-EE63-11D7-8C68DD757B4D}"/>
+              </a:ext>
+            </a:extLst>
+          </p:cNvPr>
+          <p:cNvSpPr/>
+          <p:nvPr/>
+        </p:nvSpPr>
+        <p:spPr>
+          <a:xfrm>
+            <a:off x="7226738" y="2815198"/>
+            <a:ext cx="984250" cy="423302"/>
+          </a:xfrm>
+          <a:prstGeom prst="rect">
+            <a:avLst/>
+          </a:prstGeom>
+          <a:solidFill>
+            <a:srgbClr val="E8E8E8"/>
+          </a:solidFill>
+          <a:ln>
+            <a:noFill/>
+          </a:ln>
+        </p:spPr>
+        <p:style>
+          <a:lnRef idx="2">
+            <a:schemeClr val="accent6"/>
+          </a:lnRef>
+          <a:fillRef idx="1">
+            <a:schemeClr val="lt1"/>
+          </a:fillRef>
+          <a:effectRef idx="0">
+            <a:schemeClr val="accent6"/>
+          </a:effectRef>
+          <a:fontRef idx="minor">
+            <a:schemeClr val="dk1"/>
+          </a:fontRef>
+        </p:style>
+        <p:txBody>
+          <a:bodyPr rtlCol="0" anchor="ctr"/>
+          <a:lstStyle/>
+          <a:p>
+            <a:pPr algn="ctr"/>
+            <a:r>
+              <a:rPr lang="es-ES" sz="1000" dirty="0">
+                <a:solidFill>
+                  <a:schemeClr val="bg2">
+                    <a:lumMod val="10000"/>
+                  </a:schemeClr>
+                </a:solidFill>
+                <a:latin typeface="Abadi" panose="020B0604020104020204" pitchFamily="34" charset="0"/>
+              </a:rPr>
+              <a:t>Variable </a:t>
+            </a:r>
+            <a:r>
+              <a:rPr lang="es-ES" sz="1000" dirty="0" err="1">
+                <a:solidFill>
+                  <a:schemeClr val="bg2">
+                    <a:lumMod val="10000"/>
+                  </a:schemeClr>
+                </a:solidFill>
+                <a:latin typeface="Abadi" panose="020B0604020104020204" pitchFamily="34" charset="0"/>
+              </a:rPr>
+              <a:t>masking</a:t>
+            </a:r>
+            <a:endParaRPr lang="es-CO" sz="1000" dirty="0">
+              <a:solidFill>
+                <a:schemeClr val="bg2">
+                  <a:lumMod val="10000"/>
+                </a:schemeClr>
+              </a:solidFill>
+              <a:latin typeface="Abadi" panose="020B0604020104020204" pitchFamily="34" charset="0"/>
+            </a:endParaRPr>
+          </a:p>
+        </p:txBody>
+      </p:sp>
+      <p:sp>
+        <p:nvSpPr>
+          <p:cNvPr id="22" name="Rectángulo 21">
+            <a:extLst>
+              <a:ext uri="{FF2B5EF4-FFF2-40B4-BE49-F238E27FC236}">
+                <a16:creationId xmlns:a16="http://schemas.microsoft.com/office/drawing/2014/main" id="{857230F8-E1E2-30B5-BE05-F83D9865A28E}"/>
+              </a:ext>
+            </a:extLst>
+          </p:cNvPr>
+          <p:cNvSpPr/>
+          <p:nvPr/>
+        </p:nvSpPr>
+        <p:spPr>
+          <a:xfrm>
+            <a:off x="8249088" y="2871274"/>
+            <a:ext cx="1517212" cy="211651"/>
+          </a:xfrm>
+          <a:prstGeom prst="rect">
+            <a:avLst/>
+          </a:prstGeom>
+          <a:solidFill>
+            <a:srgbClr val="E8E8E8"/>
+          </a:solidFill>
+          <a:ln>
+            <a:noFill/>
+          </a:ln>
+        </p:spPr>
+        <p:style>
+          <a:lnRef idx="2">
+            <a:schemeClr val="accent6"/>
+          </a:lnRef>
+          <a:fillRef idx="1">
+            <a:schemeClr val="lt1"/>
+          </a:fillRef>
+          <a:effectRef idx="0">
+            <a:schemeClr val="accent6"/>
+          </a:effectRef>
+          <a:fontRef idx="minor">
+            <a:schemeClr val="dk1"/>
+          </a:fontRef>
+        </p:style>
+        <p:txBody>
+          <a:bodyPr rtlCol="0" anchor="ctr"/>
+          <a:lstStyle/>
+          <a:p>
+            <a:pPr algn="ctr"/>
+            <a:r>
+              <a:rPr lang="es-ES" sz="1000" dirty="0" err="1">
+                <a:solidFill>
+                  <a:schemeClr val="bg2">
+                    <a:lumMod val="10000"/>
+                  </a:schemeClr>
+                </a:solidFill>
+                <a:latin typeface="Abadi" panose="020B0604020104020204" pitchFamily="34" charset="0"/>
+              </a:rPr>
+              <a:t>Correlation</a:t>
+            </a:r>
+            <a:r>
+              <a:rPr lang="es-ES" sz="1000" dirty="0">
+                <a:solidFill>
+                  <a:schemeClr val="bg2">
+                    <a:lumMod val="10000"/>
+                  </a:schemeClr>
+                </a:solidFill>
+                <a:latin typeface="Abadi" panose="020B0604020104020204" pitchFamily="34" charset="0"/>
+              </a:rPr>
+              <a:t> </a:t>
+            </a:r>
+            <a:r>
+              <a:rPr lang="es-ES" sz="1000" dirty="0" err="1">
+                <a:solidFill>
+                  <a:schemeClr val="bg2">
+                    <a:lumMod val="10000"/>
+                  </a:schemeClr>
+                </a:solidFill>
+                <a:latin typeface="Abadi" panose="020B0604020104020204" pitchFamily="34" charset="0"/>
+              </a:rPr>
+              <a:t>management</a:t>
+            </a:r>
+            <a:endParaRPr lang="es-CO" sz="1000" dirty="0">
+              <a:solidFill>
+                <a:schemeClr val="bg2">
+                  <a:lumMod val="10000"/>
+                </a:schemeClr>
+              </a:solidFill>
+              <a:latin typeface="Abadi" panose="020B0604020104020204" pitchFamily="34" charset="0"/>
+            </a:endParaRPr>
+          </a:p>
+        </p:txBody>
+      </p:sp>
+      <p:sp>
+        <p:nvSpPr>
+          <p:cNvPr id="23" name="Rectángulo 22">
+            <a:extLst>
+              <a:ext uri="{FF2B5EF4-FFF2-40B4-BE49-F238E27FC236}">
+                <a16:creationId xmlns:a16="http://schemas.microsoft.com/office/drawing/2014/main" id="{5879A995-98FC-A4E9-97A5-35CAF0469517}"/>
+              </a:ext>
+            </a:extLst>
+          </p:cNvPr>
+          <p:cNvSpPr/>
+          <p:nvPr/>
+        </p:nvSpPr>
+        <p:spPr>
+          <a:xfrm>
+            <a:off x="8112618" y="4622017"/>
+            <a:ext cx="1681821" cy="356383"/>
+          </a:xfrm>
+          <a:prstGeom prst="rect">
+            <a:avLst/>
+          </a:prstGeom>
+          <a:ln>
+            <a:noFill/>
+          </a:ln>
+        </p:spPr>
+        <p:style>
+          <a:lnRef idx="2">
+            <a:schemeClr val="accent6"/>
+          </a:lnRef>
+          <a:fillRef idx="1">
+            <a:schemeClr val="lt1"/>
+          </a:fillRef>
+          <a:effectRef idx="0">
+            <a:schemeClr val="accent6"/>
+          </a:effectRef>
+          <a:fontRef idx="minor">
+            <a:schemeClr val="dk1"/>
+          </a:fontRef>
+        </p:style>
+        <p:txBody>
+          <a:bodyPr rtlCol="0" anchor="ctr"/>
+          <a:lstStyle/>
+          <a:p>
+            <a:pPr algn="ctr"/>
+            <a:r>
+              <a:rPr lang="es-ES" sz="1000" dirty="0" err="1">
+                <a:solidFill>
+                  <a:schemeClr val="bg2">
+                    <a:lumMod val="25000"/>
+                  </a:schemeClr>
+                </a:solidFill>
+                <a:latin typeface="Abadi" panose="020B0604020104020204" pitchFamily="34" charset="0"/>
+              </a:rPr>
+              <a:t>Spatial</a:t>
+            </a:r>
+            <a:r>
+              <a:rPr lang="es-ES" sz="1000" dirty="0">
+                <a:solidFill>
+                  <a:schemeClr val="bg2">
+                    <a:lumMod val="25000"/>
+                  </a:schemeClr>
+                </a:solidFill>
+                <a:latin typeface="Abadi" panose="020B0604020104020204" pitchFamily="34" charset="0"/>
+              </a:rPr>
+              <a:t> and temporal </a:t>
+            </a:r>
+            <a:r>
+              <a:rPr lang="es-ES" sz="1000" dirty="0" err="1">
+                <a:solidFill>
+                  <a:schemeClr val="bg2">
+                    <a:lumMod val="25000"/>
+                  </a:schemeClr>
+                </a:solidFill>
+                <a:latin typeface="Abadi" panose="020B0604020104020204" pitchFamily="34" charset="0"/>
+              </a:rPr>
+              <a:t>transferency</a:t>
+            </a:r>
+            <a:endParaRPr lang="es-CO" sz="1000" dirty="0">
+              <a:solidFill>
+                <a:schemeClr val="bg2">
+                  <a:lumMod val="25000"/>
+                </a:schemeClr>
+              </a:solidFill>
+              <a:latin typeface="Abadi" panose="020B0604020104020204" pitchFamily="34" charset="0"/>
+            </a:endParaRPr>
+          </a:p>
+        </p:txBody>
+      </p:sp>
+      <p:sp>
+        <p:nvSpPr>
+          <p:cNvPr id="24" name="Rectángulo 23">
+            <a:extLst>
+              <a:ext uri="{FF2B5EF4-FFF2-40B4-BE49-F238E27FC236}">
+                <a16:creationId xmlns:a16="http://schemas.microsoft.com/office/drawing/2014/main" id="{8E2084B8-2EDD-B2DA-C701-C970C83B3455}"/>
+              </a:ext>
+            </a:extLst>
+          </p:cNvPr>
+          <p:cNvSpPr/>
+          <p:nvPr/>
+        </p:nvSpPr>
+        <p:spPr>
+          <a:xfrm>
+            <a:off x="6773697" y="4628367"/>
+            <a:ext cx="1215532" cy="356383"/>
+          </a:xfrm>
+          <a:prstGeom prst="rect">
+            <a:avLst/>
+          </a:prstGeom>
+          <a:ln>
+            <a:noFill/>
+          </a:ln>
+        </p:spPr>
+        <p:style>
+          <a:lnRef idx="2">
+            <a:schemeClr val="accent6"/>
+          </a:lnRef>
+          <a:fillRef idx="1">
+            <a:schemeClr val="lt1"/>
+          </a:fillRef>
+          <a:effectRef idx="0">
+            <a:schemeClr val="accent6"/>
+          </a:effectRef>
+          <a:fontRef idx="minor">
+            <a:schemeClr val="dk1"/>
+          </a:fontRef>
+        </p:style>
+        <p:txBody>
+          <a:bodyPr rtlCol="0" anchor="ctr"/>
+          <a:lstStyle/>
+          <a:p>
+            <a:pPr algn="ctr"/>
+            <a:r>
+              <a:rPr lang="es-ES" sz="1000" dirty="0" err="1">
+                <a:solidFill>
+                  <a:schemeClr val="bg2">
+                    <a:lumMod val="25000"/>
+                  </a:schemeClr>
+                </a:solidFill>
+                <a:latin typeface="Abadi" panose="020B0604020104020204" pitchFamily="34" charset="0"/>
+              </a:rPr>
+              <a:t>Selecting</a:t>
+            </a:r>
+            <a:r>
+              <a:rPr lang="es-ES" sz="1000" dirty="0">
+                <a:solidFill>
+                  <a:schemeClr val="bg2">
+                    <a:lumMod val="25000"/>
+                  </a:schemeClr>
+                </a:solidFill>
+                <a:latin typeface="Abadi" panose="020B0604020104020204" pitchFamily="34" charset="0"/>
+              </a:rPr>
+              <a:t> </a:t>
+            </a:r>
+            <a:r>
+              <a:rPr lang="es-ES" sz="1000" dirty="0" err="1">
+                <a:solidFill>
+                  <a:schemeClr val="bg2">
+                    <a:lumMod val="25000"/>
+                  </a:schemeClr>
+                </a:solidFill>
+                <a:latin typeface="Abadi" panose="020B0604020104020204" pitchFamily="34" charset="0"/>
+              </a:rPr>
+              <a:t>best</a:t>
+            </a:r>
+            <a:r>
+              <a:rPr lang="es-ES" sz="1000" dirty="0">
+                <a:solidFill>
+                  <a:schemeClr val="bg2">
+                    <a:lumMod val="25000"/>
+                  </a:schemeClr>
+                </a:solidFill>
+                <a:latin typeface="Abadi" panose="020B0604020104020204" pitchFamily="34" charset="0"/>
+              </a:rPr>
+              <a:t> </a:t>
+            </a:r>
+            <a:r>
+              <a:rPr lang="es-ES" sz="1000" dirty="0" err="1">
+                <a:solidFill>
+                  <a:schemeClr val="bg2">
+                    <a:lumMod val="25000"/>
+                  </a:schemeClr>
+                </a:solidFill>
+                <a:latin typeface="Abadi" panose="020B0604020104020204" pitchFamily="34" charset="0"/>
+              </a:rPr>
+              <a:t>models</a:t>
+            </a:r>
+            <a:endParaRPr lang="es-CO" sz="1000" dirty="0">
+              <a:solidFill>
+                <a:schemeClr val="bg2">
+                  <a:lumMod val="25000"/>
+                </a:schemeClr>
+              </a:solidFill>
+              <a:latin typeface="Abadi" panose="020B0604020104020204" pitchFamily="34" charset="0"/>
+            </a:endParaRPr>
+          </a:p>
+        </p:txBody>
+      </p:sp>
+      <p:sp>
+        <p:nvSpPr>
+          <p:cNvPr id="25" name="Rectángulo 24">
+            <a:extLst>
+              <a:ext uri="{FF2B5EF4-FFF2-40B4-BE49-F238E27FC236}">
+                <a16:creationId xmlns:a16="http://schemas.microsoft.com/office/drawing/2014/main" id="{303E58C7-6E05-9931-D047-0E391E66B341}"/>
+              </a:ext>
+            </a:extLst>
+          </p:cNvPr>
+          <p:cNvSpPr/>
+          <p:nvPr/>
+        </p:nvSpPr>
+        <p:spPr>
+          <a:xfrm>
+            <a:off x="5333176" y="4614884"/>
+            <a:ext cx="1317132" cy="356383"/>
+          </a:xfrm>
+          <a:prstGeom prst="rect">
+            <a:avLst/>
+          </a:prstGeom>
+          <a:ln>
+            <a:noFill/>
+          </a:ln>
+        </p:spPr>
+        <p:style>
+          <a:lnRef idx="2">
+            <a:schemeClr val="accent6"/>
+          </a:lnRef>
+          <a:fillRef idx="1">
+            <a:schemeClr val="lt1"/>
+          </a:fillRef>
+          <a:effectRef idx="0">
+            <a:schemeClr val="accent6"/>
+          </a:effectRef>
+          <a:fontRef idx="minor">
+            <a:schemeClr val="dk1"/>
+          </a:fontRef>
+        </p:style>
+        <p:txBody>
+          <a:bodyPr rtlCol="0" anchor="ctr"/>
+          <a:lstStyle/>
+          <a:p>
+            <a:pPr algn="ctr"/>
+            <a:r>
+              <a:rPr lang="es-ES" sz="1000" dirty="0" err="1">
+                <a:solidFill>
+                  <a:schemeClr val="bg2">
+                    <a:lumMod val="25000"/>
+                  </a:schemeClr>
+                </a:solidFill>
+                <a:latin typeface="Abadi" panose="020B0604020104020204" pitchFamily="34" charset="0"/>
+              </a:rPr>
+              <a:t>Adjust</a:t>
+            </a:r>
+            <a:r>
+              <a:rPr lang="es-ES" sz="1000" dirty="0">
+                <a:solidFill>
+                  <a:schemeClr val="bg2">
+                    <a:lumMod val="25000"/>
+                  </a:schemeClr>
+                </a:solidFill>
+                <a:latin typeface="Abadi" panose="020B0604020104020204" pitchFamily="34" charset="0"/>
+              </a:rPr>
+              <a:t> </a:t>
+            </a:r>
+            <a:r>
+              <a:rPr lang="es-ES" sz="1000" dirty="0" err="1">
+                <a:solidFill>
+                  <a:schemeClr val="bg2">
+                    <a:lumMod val="25000"/>
+                  </a:schemeClr>
+                </a:solidFill>
+                <a:latin typeface="Abadi" panose="020B0604020104020204" pitchFamily="34" charset="0"/>
+              </a:rPr>
+              <a:t>hyperpameters</a:t>
+            </a:r>
+            <a:endParaRPr lang="es-CO" sz="1000" dirty="0">
+              <a:solidFill>
+                <a:schemeClr val="bg2">
+                  <a:lumMod val="25000"/>
+                </a:schemeClr>
+              </a:solidFill>
+              <a:latin typeface="Abadi" panose="020B0604020104020204" pitchFamily="34" charset="0"/>
+            </a:endParaRPr>
+          </a:p>
+        </p:txBody>
+      </p:sp>
+      <p:sp>
+        <p:nvSpPr>
+          <p:cNvPr id="26" name="Rectángulo 25">
+            <a:extLst>
+              <a:ext uri="{FF2B5EF4-FFF2-40B4-BE49-F238E27FC236}">
+                <a16:creationId xmlns:a16="http://schemas.microsoft.com/office/drawing/2014/main" id="{5A62C50A-E2D8-6ABB-C65A-80DD8FD4E5B9}"/>
+              </a:ext>
+            </a:extLst>
+          </p:cNvPr>
+          <p:cNvSpPr/>
+          <p:nvPr/>
+        </p:nvSpPr>
+        <p:spPr>
+          <a:xfrm>
+            <a:off x="4192911" y="4634716"/>
+            <a:ext cx="805521" cy="356383"/>
+          </a:xfrm>
+          <a:prstGeom prst="rect">
+            <a:avLst/>
+          </a:prstGeom>
+          <a:ln>
+            <a:noFill/>
+          </a:ln>
+        </p:spPr>
+        <p:style>
+          <a:lnRef idx="2">
+            <a:schemeClr val="accent6"/>
+          </a:lnRef>
+          <a:fillRef idx="1">
+            <a:schemeClr val="lt1"/>
+          </a:fillRef>
+          <a:effectRef idx="0">
+            <a:schemeClr val="accent6"/>
+          </a:effectRef>
+          <a:fontRef idx="minor">
+            <a:schemeClr val="dk1"/>
+          </a:fontRef>
+        </p:style>
+        <p:txBody>
+          <a:bodyPr rtlCol="0" anchor="ctr"/>
+          <a:lstStyle/>
+          <a:p>
+            <a:pPr algn="ctr"/>
+            <a:r>
+              <a:rPr lang="es-ES" sz="1000" dirty="0" err="1">
+                <a:solidFill>
+                  <a:schemeClr val="bg2">
+                    <a:lumMod val="25000"/>
+                  </a:schemeClr>
+                </a:solidFill>
+                <a:latin typeface="Abadi" panose="020B0604020104020204" pitchFamily="34" charset="0"/>
+              </a:rPr>
+              <a:t>Splitting</a:t>
+            </a:r>
+            <a:r>
+              <a:rPr lang="es-ES" sz="1000" dirty="0">
+                <a:solidFill>
+                  <a:schemeClr val="bg2">
+                    <a:lumMod val="25000"/>
+                  </a:schemeClr>
+                </a:solidFill>
+                <a:latin typeface="Abadi" panose="020B0604020104020204" pitchFamily="34" charset="0"/>
+              </a:rPr>
+              <a:t> data</a:t>
+            </a:r>
+            <a:endParaRPr lang="es-CO" sz="1000" dirty="0">
+              <a:solidFill>
+                <a:schemeClr val="bg2">
+                  <a:lumMod val="25000"/>
+                </a:schemeClr>
+              </a:solidFill>
+              <a:latin typeface="Abadi" panose="020B0604020104020204" pitchFamily="34" charset="0"/>
+            </a:endParaRPr>
+          </a:p>
+        </p:txBody>
+      </p:sp>
+      <p:sp>
+        <p:nvSpPr>
+          <p:cNvPr id="27" name="Rectángulo 26">
+            <a:extLst>
+              <a:ext uri="{FF2B5EF4-FFF2-40B4-BE49-F238E27FC236}">
+                <a16:creationId xmlns:a16="http://schemas.microsoft.com/office/drawing/2014/main" id="{1F6AA5E8-C983-D43A-2C37-53C739509F49}"/>
+              </a:ext>
+            </a:extLst>
+          </p:cNvPr>
+          <p:cNvSpPr/>
+          <p:nvPr/>
+        </p:nvSpPr>
+        <p:spPr>
+          <a:xfrm>
+            <a:off x="2641438" y="4569650"/>
+            <a:ext cx="1317132" cy="356383"/>
+          </a:xfrm>
+          <a:prstGeom prst="rect">
+            <a:avLst/>
+          </a:prstGeom>
+          <a:ln>
+            <a:noFill/>
+          </a:ln>
+        </p:spPr>
+        <p:style>
+          <a:lnRef idx="2">
+            <a:schemeClr val="accent6"/>
+          </a:lnRef>
+          <a:fillRef idx="1">
+            <a:schemeClr val="lt1"/>
+          </a:fillRef>
+          <a:effectRef idx="0">
+            <a:schemeClr val="accent6"/>
+          </a:effectRef>
+          <a:fontRef idx="minor">
+            <a:schemeClr val="dk1"/>
+          </a:fontRef>
+        </p:style>
+        <p:txBody>
+          <a:bodyPr rtlCol="0" anchor="ctr"/>
+          <a:lstStyle/>
+          <a:p>
+            <a:pPr algn="ctr"/>
+            <a:r>
+              <a:rPr lang="es-ES" sz="1000" dirty="0" err="1">
+                <a:solidFill>
+                  <a:schemeClr val="bg2">
+                    <a:lumMod val="25000"/>
+                  </a:schemeClr>
+                </a:solidFill>
+                <a:latin typeface="Abadi" panose="020B0604020104020204" pitchFamily="34" charset="0"/>
+              </a:rPr>
+              <a:t>Choose</a:t>
+            </a:r>
+            <a:r>
+              <a:rPr lang="es-ES" sz="1000" dirty="0">
+                <a:solidFill>
+                  <a:schemeClr val="bg2">
+                    <a:lumMod val="25000"/>
+                  </a:schemeClr>
+                </a:solidFill>
+                <a:latin typeface="Abadi" panose="020B0604020104020204" pitchFamily="34" charset="0"/>
+              </a:rPr>
+              <a:t> </a:t>
+            </a:r>
+            <a:r>
+              <a:rPr lang="es-ES" sz="1000" dirty="0" err="1">
+                <a:solidFill>
+                  <a:schemeClr val="bg2">
+                    <a:lumMod val="25000"/>
+                  </a:schemeClr>
+                </a:solidFill>
+                <a:latin typeface="Abadi" panose="020B0604020104020204" pitchFamily="34" charset="0"/>
+              </a:rPr>
+              <a:t>algorithm</a:t>
+            </a:r>
+            <a:endParaRPr lang="es-CO" sz="1000" dirty="0">
+              <a:solidFill>
+                <a:schemeClr val="bg2">
+                  <a:lumMod val="25000"/>
+                </a:schemeClr>
+              </a:solidFill>
+              <a:latin typeface="Abadi" panose="020B0604020104020204" pitchFamily="34" charset="0"/>
+            </a:endParaRPr>
+          </a:p>
+        </p:txBody>
+      </p:sp>
+      <p:sp>
+        <p:nvSpPr>
+          <p:cNvPr id="28" name="Rectángulo 27">
+            <a:extLst>
+              <a:ext uri="{FF2B5EF4-FFF2-40B4-BE49-F238E27FC236}">
+                <a16:creationId xmlns:a16="http://schemas.microsoft.com/office/drawing/2014/main" id="{DA4C08E3-9374-2E77-E79F-DE6C4C06F9A7}"/>
+              </a:ext>
+            </a:extLst>
+          </p:cNvPr>
+          <p:cNvSpPr/>
+          <p:nvPr/>
+        </p:nvSpPr>
+        <p:spPr>
+          <a:xfrm>
+            <a:off x="4027707" y="6260514"/>
+            <a:ext cx="1317132" cy="288574"/>
+          </a:xfrm>
+          <a:prstGeom prst="rect">
+            <a:avLst/>
+          </a:prstGeom>
+          <a:solidFill>
+            <a:srgbClr val="EFF6FF"/>
+          </a:solidFill>
+          <a:ln>
+            <a:noFill/>
+          </a:ln>
+        </p:spPr>
+        <p:style>
+          <a:lnRef idx="2">
+            <a:schemeClr val="accent6"/>
+          </a:lnRef>
+          <a:fillRef idx="1">
+            <a:schemeClr val="lt1"/>
+          </a:fillRef>
+          <a:effectRef idx="0">
+            <a:schemeClr val="accent6"/>
+          </a:effectRef>
+          <a:fontRef idx="minor">
+            <a:schemeClr val="dk1"/>
+          </a:fontRef>
+        </p:style>
+        <p:txBody>
+          <a:bodyPr rtlCol="0" anchor="ctr"/>
+          <a:lstStyle/>
+          <a:p>
+            <a:pPr algn="ctr"/>
+            <a:r>
+              <a:rPr lang="es-ES" sz="900" dirty="0" err="1">
+                <a:solidFill>
+                  <a:schemeClr val="bg2">
+                    <a:lumMod val="25000"/>
+                  </a:schemeClr>
+                </a:solidFill>
+                <a:latin typeface="Abadi" panose="020B0604020104020204" pitchFamily="34" charset="0"/>
+              </a:rPr>
+              <a:t>Binary</a:t>
+            </a:r>
+            <a:r>
+              <a:rPr lang="es-ES" sz="900" dirty="0">
+                <a:solidFill>
+                  <a:schemeClr val="bg2">
+                    <a:lumMod val="25000"/>
+                  </a:schemeClr>
+                </a:solidFill>
+                <a:latin typeface="Abadi" panose="020B0604020104020204" pitchFamily="34" charset="0"/>
+              </a:rPr>
+              <a:t> and continuos </a:t>
+            </a:r>
+            <a:r>
+              <a:rPr lang="es-ES" sz="900" dirty="0" err="1">
+                <a:solidFill>
+                  <a:schemeClr val="bg2">
+                    <a:lumMod val="25000"/>
+                  </a:schemeClr>
+                </a:solidFill>
+                <a:latin typeface="Abadi" panose="020B0604020104020204" pitchFamily="34" charset="0"/>
+              </a:rPr>
+              <a:t>surfaces</a:t>
+            </a:r>
+            <a:endParaRPr lang="es-CO" sz="900" dirty="0">
+              <a:solidFill>
+                <a:schemeClr val="bg2">
+                  <a:lumMod val="25000"/>
+                </a:schemeClr>
+              </a:solidFill>
+              <a:latin typeface="Abadi" panose="020B0604020104020204" pitchFamily="34" charset="0"/>
+            </a:endParaRPr>
+          </a:p>
+        </p:txBody>
+      </p:sp>
+      <p:sp>
+        <p:nvSpPr>
+          <p:cNvPr id="29" name="Rectángulo 28">
+            <a:extLst>
+              <a:ext uri="{FF2B5EF4-FFF2-40B4-BE49-F238E27FC236}">
+                <a16:creationId xmlns:a16="http://schemas.microsoft.com/office/drawing/2014/main" id="{CF1775E2-83D1-784B-CF09-A355C8C8B435}"/>
+              </a:ext>
+            </a:extLst>
+          </p:cNvPr>
+          <p:cNvSpPr/>
+          <p:nvPr/>
+        </p:nvSpPr>
+        <p:spPr>
+          <a:xfrm>
+            <a:off x="5869236" y="6260514"/>
+            <a:ext cx="1164732" cy="288574"/>
+          </a:xfrm>
+          <a:prstGeom prst="rect">
+            <a:avLst/>
+          </a:prstGeom>
+          <a:solidFill>
+            <a:srgbClr val="EFF6FF"/>
+          </a:solidFill>
+          <a:ln>
+            <a:noFill/>
+          </a:ln>
+        </p:spPr>
+        <p:style>
+          <a:lnRef idx="2">
+            <a:schemeClr val="accent6"/>
+          </a:lnRef>
+          <a:fillRef idx="1">
+            <a:schemeClr val="lt1"/>
+          </a:fillRef>
+          <a:effectRef idx="0">
+            <a:schemeClr val="accent6"/>
+          </a:effectRef>
+          <a:fontRef idx="minor">
+            <a:schemeClr val="dk1"/>
+          </a:fontRef>
+        </p:style>
+        <p:txBody>
+          <a:bodyPr rtlCol="0" anchor="ctr"/>
+          <a:lstStyle/>
+          <a:p>
+            <a:pPr algn="ctr"/>
+            <a:r>
+              <a:rPr lang="es-ES" sz="900" dirty="0" err="1">
+                <a:solidFill>
+                  <a:schemeClr val="bg2">
+                    <a:lumMod val="25000"/>
+                  </a:schemeClr>
+                </a:solidFill>
+                <a:latin typeface="Abadi" panose="020B0604020104020204" pitchFamily="34" charset="0"/>
+              </a:rPr>
+              <a:t>Variability</a:t>
+            </a:r>
+            <a:r>
+              <a:rPr lang="es-ES" sz="900" dirty="0">
+                <a:solidFill>
+                  <a:schemeClr val="bg2">
+                    <a:lumMod val="25000"/>
+                  </a:schemeClr>
+                </a:solidFill>
+                <a:latin typeface="Abadi" panose="020B0604020104020204" pitchFamily="34" charset="0"/>
+              </a:rPr>
+              <a:t> </a:t>
+            </a:r>
+            <a:r>
+              <a:rPr lang="es-ES" sz="900" dirty="0" err="1">
+                <a:solidFill>
+                  <a:schemeClr val="bg2">
+                    <a:lumMod val="25000"/>
+                  </a:schemeClr>
+                </a:solidFill>
+                <a:latin typeface="Abadi" panose="020B0604020104020204" pitchFamily="34" charset="0"/>
+              </a:rPr>
+              <a:t>measures</a:t>
+            </a:r>
+            <a:endParaRPr lang="es-CO" sz="900" dirty="0">
+              <a:solidFill>
+                <a:schemeClr val="bg2">
+                  <a:lumMod val="25000"/>
+                </a:schemeClr>
+              </a:solidFill>
+              <a:latin typeface="Abadi" panose="020B0604020104020204" pitchFamily="34" charset="0"/>
+            </a:endParaRPr>
+          </a:p>
+        </p:txBody>
+      </p:sp>
+      <p:sp>
+        <p:nvSpPr>
+          <p:cNvPr id="30" name="Rectángulo 29">
+            <a:extLst>
+              <a:ext uri="{FF2B5EF4-FFF2-40B4-BE49-F238E27FC236}">
+                <a16:creationId xmlns:a16="http://schemas.microsoft.com/office/drawing/2014/main" id="{92B71DA6-F887-E90B-C845-11928F52D17D}"/>
+              </a:ext>
+            </a:extLst>
+          </p:cNvPr>
+          <p:cNvSpPr/>
+          <p:nvPr/>
+        </p:nvSpPr>
+        <p:spPr>
+          <a:xfrm>
+            <a:off x="7406863" y="6207763"/>
+            <a:ext cx="1164732" cy="288574"/>
+          </a:xfrm>
+          <a:prstGeom prst="rect">
+            <a:avLst/>
+          </a:prstGeom>
+          <a:solidFill>
+            <a:srgbClr val="EFF6FF"/>
+          </a:solidFill>
+          <a:ln>
+            <a:noFill/>
+          </a:ln>
+        </p:spPr>
+        <p:style>
+          <a:lnRef idx="2">
+            <a:schemeClr val="accent6"/>
+          </a:lnRef>
+          <a:fillRef idx="1">
+            <a:schemeClr val="lt1"/>
+          </a:fillRef>
+          <a:effectRef idx="0">
+            <a:schemeClr val="accent6"/>
+          </a:effectRef>
+          <a:fontRef idx="minor">
+            <a:schemeClr val="dk1"/>
+          </a:fontRef>
+        </p:style>
+        <p:txBody>
+          <a:bodyPr rtlCol="0" anchor="ctr"/>
+          <a:lstStyle/>
+          <a:p>
+            <a:pPr algn="ctr"/>
+            <a:r>
+              <a:rPr lang="es-ES" sz="900" dirty="0" err="1">
+                <a:solidFill>
+                  <a:schemeClr val="bg2">
+                    <a:lumMod val="25000"/>
+                  </a:schemeClr>
+                </a:solidFill>
+                <a:latin typeface="Abadi" panose="020B0604020104020204" pitchFamily="34" charset="0"/>
+              </a:rPr>
+              <a:t>Write</a:t>
+            </a:r>
+            <a:r>
+              <a:rPr lang="es-ES" sz="900" dirty="0">
+                <a:solidFill>
+                  <a:schemeClr val="bg2">
+                    <a:lumMod val="25000"/>
+                  </a:schemeClr>
+                </a:solidFill>
+                <a:latin typeface="Abadi" panose="020B0604020104020204" pitchFamily="34" charset="0"/>
+              </a:rPr>
+              <a:t> </a:t>
+            </a:r>
+            <a:r>
+              <a:rPr lang="es-ES" sz="900" dirty="0" err="1">
+                <a:solidFill>
+                  <a:schemeClr val="bg2">
+                    <a:lumMod val="25000"/>
+                  </a:schemeClr>
+                </a:solidFill>
+                <a:latin typeface="Abadi" panose="020B0604020104020204" pitchFamily="34" charset="0"/>
+              </a:rPr>
+              <a:t>rasters</a:t>
+            </a:r>
+            <a:endParaRPr lang="es-CO" sz="900" dirty="0">
+              <a:solidFill>
+                <a:schemeClr val="bg2">
+                  <a:lumMod val="25000"/>
+                </a:schemeClr>
+              </a:solidFill>
+              <a:latin typeface="Abadi" panose="020B0604020104020204" pitchFamily="34" charset="0"/>
+            </a:endParaRPr>
+          </a:p>
+        </p:txBody>
+      </p:sp>
+    </p:spTree>
+    <p:extLst>
+      <p:ext uri="{BB962C8B-B14F-4D97-AF65-F5344CB8AC3E}">
+        <p14:creationId xmlns:p14="http://schemas.microsoft.com/office/powerpoint/2010/main" val="1158522479"/>
+      </p:ext>
+    </p:extLst>
+  </p:cSld>
+  <p:clrMapOvr>
+    <a:masterClrMapping/>
+  </p:clrMapOvr>
+</p:sld>
+</file>
+
 <file path=ppt/theme/theme1.xml><?xml version="1.0" encoding="utf-8"?>
 <a:theme xmlns:a="http://schemas.openxmlformats.org/drawingml/2006/main" name="Tema de Office">
   <a:themeElements>

</xml_diff>